<commit_message>
Subo presentacion y resumen para seguirla.
</commit_message>
<xml_diff>
--- a/Presentacion/Presentacion Final.pptx
+++ b/Presentacion/Presentacion Final.pptx
@@ -6,6 +6,18 @@
   </p:sldMasterIdLst>
   <p:sldIdLst>
     <p:sldId id="256" r:id="rId2"/>
+    <p:sldId id="260" r:id="rId3"/>
+    <p:sldId id="263" r:id="rId4"/>
+    <p:sldId id="262" r:id="rId5"/>
+    <p:sldId id="268" r:id="rId6"/>
+    <p:sldId id="259" r:id="rId7"/>
+    <p:sldId id="261" r:id="rId8"/>
+    <p:sldId id="265" r:id="rId9"/>
+    <p:sldId id="266" r:id="rId10"/>
+    <p:sldId id="264" r:id="rId11"/>
+    <p:sldId id="257" r:id="rId12"/>
+    <p:sldId id="258" r:id="rId13"/>
+    <p:sldId id="267" r:id="rId14"/>
   </p:sldIdLst>
   <p:sldSz cx="9144000" cy="6858000" type="screen4x3"/>
   <p:notesSz cx="6858000" cy="9144000"/>
@@ -288,7 +300,7 @@
           <a:p>
             <a:fld id="{D2DCFC82-683F-4A30-9D41-F91D66C01B0C}" type="datetimeFigureOut">
               <a:rPr lang="es-ES" smtClean="0"/>
-              <a:t>29/12/2015</a:t>
+              <a:t>17/03/2016</a:t>
             </a:fld>
             <a:endParaRPr lang="es-ES"/>
           </a:p>
@@ -458,7 +470,7 @@
           <a:p>
             <a:fld id="{D2DCFC82-683F-4A30-9D41-F91D66C01B0C}" type="datetimeFigureOut">
               <a:rPr lang="es-ES" smtClean="0"/>
-              <a:t>29/12/2015</a:t>
+              <a:t>17/03/2016</a:t>
             </a:fld>
             <a:endParaRPr lang="es-ES"/>
           </a:p>
@@ -638,7 +650,7 @@
           <a:p>
             <a:fld id="{D2DCFC82-683F-4A30-9D41-F91D66C01B0C}" type="datetimeFigureOut">
               <a:rPr lang="es-ES" smtClean="0"/>
-              <a:t>29/12/2015</a:t>
+              <a:t>17/03/2016</a:t>
             </a:fld>
             <a:endParaRPr lang="es-ES"/>
           </a:p>
@@ -808,7 +820,7 @@
           <a:p>
             <a:fld id="{D2DCFC82-683F-4A30-9D41-F91D66C01B0C}" type="datetimeFigureOut">
               <a:rPr lang="es-ES" smtClean="0"/>
-              <a:t>29/12/2015</a:t>
+              <a:t>17/03/2016</a:t>
             </a:fld>
             <a:endParaRPr lang="es-ES"/>
           </a:p>
@@ -1054,7 +1066,7 @@
           <a:p>
             <a:fld id="{D2DCFC82-683F-4A30-9D41-F91D66C01B0C}" type="datetimeFigureOut">
               <a:rPr lang="es-ES" smtClean="0"/>
-              <a:t>29/12/2015</a:t>
+              <a:t>17/03/2016</a:t>
             </a:fld>
             <a:endParaRPr lang="es-ES"/>
           </a:p>
@@ -1342,7 +1354,7 @@
           <a:p>
             <a:fld id="{D2DCFC82-683F-4A30-9D41-F91D66C01B0C}" type="datetimeFigureOut">
               <a:rPr lang="es-ES" smtClean="0"/>
-              <a:t>29/12/2015</a:t>
+              <a:t>17/03/2016</a:t>
             </a:fld>
             <a:endParaRPr lang="es-ES"/>
           </a:p>
@@ -1764,7 +1776,7 @@
           <a:p>
             <a:fld id="{D2DCFC82-683F-4A30-9D41-F91D66C01B0C}" type="datetimeFigureOut">
               <a:rPr lang="es-ES" smtClean="0"/>
-              <a:t>29/12/2015</a:t>
+              <a:t>17/03/2016</a:t>
             </a:fld>
             <a:endParaRPr lang="es-ES"/>
           </a:p>
@@ -1882,7 +1894,7 @@
           <a:p>
             <a:fld id="{D2DCFC82-683F-4A30-9D41-F91D66C01B0C}" type="datetimeFigureOut">
               <a:rPr lang="es-ES" smtClean="0"/>
-              <a:t>29/12/2015</a:t>
+              <a:t>17/03/2016</a:t>
             </a:fld>
             <a:endParaRPr lang="es-ES"/>
           </a:p>
@@ -1977,7 +1989,7 @@
           <a:p>
             <a:fld id="{D2DCFC82-683F-4A30-9D41-F91D66C01B0C}" type="datetimeFigureOut">
               <a:rPr lang="es-ES" smtClean="0"/>
-              <a:t>29/12/2015</a:t>
+              <a:t>17/03/2016</a:t>
             </a:fld>
             <a:endParaRPr lang="es-ES"/>
           </a:p>
@@ -2254,7 +2266,7 @@
           <a:p>
             <a:fld id="{D2DCFC82-683F-4A30-9D41-F91D66C01B0C}" type="datetimeFigureOut">
               <a:rPr lang="es-ES" smtClean="0"/>
-              <a:t>29/12/2015</a:t>
+              <a:t>17/03/2016</a:t>
             </a:fld>
             <a:endParaRPr lang="es-ES"/>
           </a:p>
@@ -2507,7 +2519,7 @@
           <a:p>
             <a:fld id="{D2DCFC82-683F-4A30-9D41-F91D66C01B0C}" type="datetimeFigureOut">
               <a:rPr lang="es-ES" smtClean="0"/>
-              <a:t>29/12/2015</a:t>
+              <a:t>17/03/2016</a:t>
             </a:fld>
             <a:endParaRPr lang="es-ES"/>
           </a:p>
@@ -2720,7 +2732,7 @@
           <a:p>
             <a:fld id="{D2DCFC82-683F-4A30-9D41-F91D66C01B0C}" type="datetimeFigureOut">
               <a:rPr lang="es-ES" smtClean="0"/>
-              <a:t>29/12/2015</a:t>
+              <a:t>17/03/2016</a:t>
             </a:fld>
             <a:endParaRPr lang="es-ES"/>
           </a:p>
@@ -3105,12 +3117,37 @@
             <p:ph type="ctrTitle"/>
           </p:nvPr>
         </p:nvSpPr>
-        <p:spPr/>
-        <p:txBody>
-          <a:bodyPr/>
-          <a:lstStyle/>
-          <a:p>
-            <a:endParaRPr lang="es-ES"/>
+        <p:spPr>
+          <a:xfrm>
+            <a:off x="2195736" y="2564904"/>
+            <a:ext cx="6620272" cy="1470025"/>
+          </a:xfrm>
+        </p:spPr>
+        <p:txBody>
+          <a:bodyPr>
+            <a:noAutofit/>
+          </a:bodyPr>
+          <a:lstStyle/>
+          <a:p>
+            <a:r>
+              <a:rPr lang="es-AR" sz="4000" dirty="0" smtClean="0"/>
+              <a:t>Control sistemático</a:t>
+            </a:r>
+            <a:br>
+              <a:rPr lang="es-AR" sz="4000" dirty="0" smtClean="0"/>
+            </a:br>
+            <a:r>
+              <a:rPr lang="es-AR" sz="4000" dirty="0" smtClean="0"/>
+              <a:t> de bobinas</a:t>
+            </a:r>
+            <a:br>
+              <a:rPr lang="es-AR" sz="4000" dirty="0" smtClean="0"/>
+            </a:br>
+            <a:r>
+              <a:rPr lang="es-AR" sz="4000" dirty="0" smtClean="0"/>
+              <a:t> de papel</a:t>
+            </a:r>
+            <a:endParaRPr lang="es-ES" sz="4000" dirty="0"/>
           </a:p>
         </p:txBody>
       </p:sp>
@@ -3124,15 +3161,56 @@
             <p:ph type="subTitle" idx="1"/>
           </p:nvPr>
         </p:nvSpPr>
-        <p:spPr/>
-        <p:txBody>
-          <a:bodyPr/>
-          <a:lstStyle/>
-          <a:p>
-            <a:endParaRPr lang="es-ES"/>
-          </a:p>
-        </p:txBody>
-      </p:sp>
+        <p:spPr>
+          <a:xfrm>
+            <a:off x="2339752" y="5805264"/>
+            <a:ext cx="6400800" cy="550912"/>
+          </a:xfrm>
+        </p:spPr>
+        <p:txBody>
+          <a:bodyPr>
+            <a:normAutofit lnSpcReduction="10000"/>
+          </a:bodyPr>
+          <a:lstStyle/>
+          <a:p>
+            <a:r>
+              <a:rPr lang="es-AR" dirty="0" smtClean="0"/>
+              <a:t>José Ignacio Castelli 94401</a:t>
+            </a:r>
+            <a:endParaRPr lang="es-ES" dirty="0"/>
+          </a:p>
+        </p:txBody>
+      </p:sp>
+      <p:pic>
+        <p:nvPicPr>
+          <p:cNvPr id="6" name="Picture 5"/>
+          <p:cNvPicPr>
+            <a:picLocks noChangeAspect="1"/>
+          </p:cNvPicPr>
+          <p:nvPr/>
+        </p:nvPicPr>
+        <p:blipFill>
+          <a:blip r:embed="rId2">
+            <a:extLst>
+              <a:ext uri="{28A0092B-C50C-407E-A947-70E740481C1C}">
+                <a14:useLocalDpi xmlns:a14="http://schemas.microsoft.com/office/drawing/2010/main" val="0"/>
+              </a:ext>
+            </a:extLst>
+          </a:blip>
+          <a:stretch>
+            <a:fillRect/>
+          </a:stretch>
+        </p:blipFill>
+        <p:spPr>
+          <a:xfrm>
+            <a:off x="308" y="332656"/>
+            <a:ext cx="2038635" cy="6165304"/>
+          </a:xfrm>
+          <a:prstGeom prst="rect">
+            <a:avLst/>
+          </a:prstGeom>
+        </p:spPr>
+      </p:pic>
     </p:spTree>
     <p:extLst>
       <p:ext uri="{BB962C8B-B14F-4D97-AF65-F5344CB8AC3E}">
@@ -3143,6 +3221,2770 @@
   <p:clrMapOvr>
     <a:masterClrMapping/>
   </p:clrMapOvr>
+  <p:timing>
+    <p:tnLst>
+      <p:par>
+        <p:cTn id="1" dur="indefinite" restart="never" nodeType="tmRoot"/>
+      </p:par>
+    </p:tnLst>
+  </p:timing>
+</p:sld>
+</file>
+
+<file path=ppt/slides/slide10.xml><?xml version="1.0" encoding="utf-8"?>
+<p:sld xmlns:a="http://schemas.openxmlformats.org/drawingml/2006/main" xmlns:r="http://schemas.openxmlformats.org/officeDocument/2006/relationships" xmlns:p="http://schemas.openxmlformats.org/presentationml/2006/main">
+  <p:cSld>
+    <p:spTree>
+      <p:nvGrpSpPr>
+        <p:cNvPr id="1" name=""/>
+        <p:cNvGrpSpPr/>
+        <p:nvPr/>
+      </p:nvGrpSpPr>
+      <p:grpSpPr>
+        <a:xfrm>
+          <a:off x="0" y="0"/>
+          <a:ext cx="0" cy="0"/>
+          <a:chOff x="0" y="0"/>
+          <a:chExt cx="0" cy="0"/>
+        </a:xfrm>
+      </p:grpSpPr>
+      <p:sp>
+        <p:nvSpPr>
+          <p:cNvPr id="2" name="Title 1"/>
+          <p:cNvSpPr>
+            <a:spLocks noGrp="1"/>
+          </p:cNvSpPr>
+          <p:nvPr>
+            <p:ph type="title"/>
+          </p:nvPr>
+        </p:nvSpPr>
+        <p:spPr>
+          <a:xfrm>
+            <a:off x="179512" y="-27384"/>
+            <a:ext cx="8229600" cy="1143000"/>
+          </a:xfrm>
+        </p:spPr>
+        <p:txBody>
+          <a:bodyPr/>
+          <a:lstStyle/>
+          <a:p>
+            <a:r>
+              <a:rPr lang="es-AR" dirty="0" smtClean="0"/>
+              <a:t>Soluciones </a:t>
+            </a:r>
+            <a:endParaRPr lang="es-ES" dirty="0"/>
+          </a:p>
+        </p:txBody>
+      </p:sp>
+      <p:sp>
+        <p:nvSpPr>
+          <p:cNvPr id="3" name="Content Placeholder 2"/>
+          <p:cNvSpPr>
+            <a:spLocks noGrp="1"/>
+          </p:cNvSpPr>
+          <p:nvPr>
+            <p:ph idx="1"/>
+          </p:nvPr>
+        </p:nvSpPr>
+        <p:spPr>
+          <a:xfrm>
+            <a:off x="35496" y="3501008"/>
+            <a:ext cx="7962799" cy="2088232"/>
+          </a:xfrm>
+        </p:spPr>
+        <p:txBody>
+          <a:bodyPr/>
+          <a:lstStyle/>
+          <a:p>
+            <a:r>
+              <a:rPr lang="es-AR" dirty="0" smtClean="0"/>
+              <a:t>Consulta de experto</a:t>
+            </a:r>
+          </a:p>
+          <a:p>
+            <a:pPr marL="0" indent="0">
+              <a:buNone/>
+            </a:pPr>
+            <a:endParaRPr lang="es-AR" dirty="0" smtClean="0"/>
+          </a:p>
+          <a:p>
+            <a:r>
+              <a:rPr lang="es-AR" dirty="0" smtClean="0"/>
+              <a:t>Amoldar a las diferentes situaciones</a:t>
+            </a:r>
+          </a:p>
+          <a:p>
+            <a:endParaRPr lang="es-ES" dirty="0"/>
+          </a:p>
+        </p:txBody>
+      </p:sp>
+      <p:pic>
+        <p:nvPicPr>
+          <p:cNvPr id="4" name="Picture 3"/>
+          <p:cNvPicPr>
+            <a:picLocks noChangeAspect="1"/>
+          </p:cNvPicPr>
+          <p:nvPr/>
+        </p:nvPicPr>
+        <p:blipFill>
+          <a:blip r:embed="rId2">
+            <a:extLst>
+              <a:ext uri="{28A0092B-C50C-407E-A947-70E740481C1C}">
+                <a14:useLocalDpi xmlns:a14="http://schemas.microsoft.com/office/drawing/2010/main" val="0"/>
+              </a:ext>
+            </a:extLst>
+          </a:blip>
+          <a:stretch>
+            <a:fillRect/>
+          </a:stretch>
+        </p:blipFill>
+        <p:spPr>
+          <a:xfrm>
+            <a:off x="8419999" y="0"/>
+            <a:ext cx="724001" cy="6858000"/>
+          </a:xfrm>
+          <a:prstGeom prst="rect">
+            <a:avLst/>
+          </a:prstGeom>
+        </p:spPr>
+      </p:pic>
+      <p:sp>
+        <p:nvSpPr>
+          <p:cNvPr id="5" name="Rectangle 4"/>
+          <p:cNvSpPr/>
+          <p:nvPr/>
+        </p:nvSpPr>
+        <p:spPr>
+          <a:xfrm>
+            <a:off x="2016224" y="1497558"/>
+            <a:ext cx="4572000" cy="923330"/>
+          </a:xfrm>
+          <a:prstGeom prst="rect">
+            <a:avLst/>
+          </a:prstGeom>
+        </p:spPr>
+        <p:txBody>
+          <a:bodyPr>
+            <a:spAutoFit/>
+          </a:bodyPr>
+          <a:lstStyle/>
+          <a:p>
+            <a:pPr algn="ctr"/>
+            <a:r>
+              <a:rPr lang="es-AR" sz="2700" u="sng" dirty="0"/>
+              <a:t>Conector RS232 (Balanza)</a:t>
+            </a:r>
+          </a:p>
+          <a:p>
+            <a:pPr algn="ctr"/>
+            <a:r>
+              <a:rPr lang="es-AR" sz="2700" u="sng" dirty="0"/>
+              <a:t>Interacción obreros</a:t>
+            </a:r>
+          </a:p>
+        </p:txBody>
+      </p:sp>
+    </p:spTree>
+    <p:extLst>
+      <p:ext uri="{BB962C8B-B14F-4D97-AF65-F5344CB8AC3E}">
+        <p14:creationId xmlns:p14="http://schemas.microsoft.com/office/powerpoint/2010/main" val="4012911170"/>
+      </p:ext>
+    </p:extLst>
+  </p:cSld>
+  <p:clrMapOvr>
+    <a:masterClrMapping/>
+  </p:clrMapOvr>
+  <p:timing>
+    <p:tnLst>
+      <p:par>
+        <p:cTn id="1" dur="indefinite" restart="never" nodeType="tmRoot"/>
+      </p:par>
+    </p:tnLst>
+  </p:timing>
+</p:sld>
+</file>
+
+<file path=ppt/slides/slide11.xml><?xml version="1.0" encoding="utf-8"?>
+<p:sld xmlns:a="http://schemas.openxmlformats.org/drawingml/2006/main" xmlns:r="http://schemas.openxmlformats.org/officeDocument/2006/relationships" xmlns:p="http://schemas.openxmlformats.org/presentationml/2006/main">
+  <p:cSld>
+    <p:spTree>
+      <p:nvGrpSpPr>
+        <p:cNvPr id="1" name=""/>
+        <p:cNvGrpSpPr/>
+        <p:nvPr/>
+      </p:nvGrpSpPr>
+      <p:grpSpPr>
+        <a:xfrm>
+          <a:off x="0" y="0"/>
+          <a:ext cx="0" cy="0"/>
+          <a:chOff x="0" y="0"/>
+          <a:chExt cx="0" cy="0"/>
+        </a:xfrm>
+      </p:grpSpPr>
+      <p:sp>
+        <p:nvSpPr>
+          <p:cNvPr id="2" name="Title 1"/>
+          <p:cNvSpPr>
+            <a:spLocks noGrp="1"/>
+          </p:cNvSpPr>
+          <p:nvPr>
+            <p:ph type="title"/>
+          </p:nvPr>
+        </p:nvSpPr>
+        <p:spPr>
+          <a:xfrm>
+            <a:off x="179512" y="-27384"/>
+            <a:ext cx="8229600" cy="1143000"/>
+          </a:xfrm>
+        </p:spPr>
+        <p:txBody>
+          <a:bodyPr/>
+          <a:lstStyle/>
+          <a:p>
+            <a:r>
+              <a:rPr lang="es-AR" dirty="0" smtClean="0"/>
+              <a:t>Experiencia</a:t>
+            </a:r>
+            <a:endParaRPr lang="es-ES" dirty="0"/>
+          </a:p>
+        </p:txBody>
+      </p:sp>
+      <p:sp>
+        <p:nvSpPr>
+          <p:cNvPr id="3" name="Content Placeholder 2"/>
+          <p:cNvSpPr>
+            <a:spLocks noGrp="1"/>
+          </p:cNvSpPr>
+          <p:nvPr>
+            <p:ph idx="1"/>
+          </p:nvPr>
+        </p:nvSpPr>
+        <p:spPr>
+          <a:xfrm>
+            <a:off x="35496" y="2071389"/>
+            <a:ext cx="7962799" cy="3517851"/>
+          </a:xfrm>
+        </p:spPr>
+        <p:txBody>
+          <a:bodyPr/>
+          <a:lstStyle/>
+          <a:p>
+            <a:r>
+              <a:rPr lang="es-AR" dirty="0" smtClean="0"/>
+              <a:t>Mejoras en la </a:t>
+            </a:r>
+            <a:r>
+              <a:rPr lang="es-AR" dirty="0" smtClean="0"/>
+              <a:t>empresa</a:t>
+            </a:r>
+            <a:endParaRPr lang="es-AR" dirty="0"/>
+          </a:p>
+          <a:p>
+            <a:r>
+              <a:rPr lang="es-AR" dirty="0" smtClean="0"/>
+              <a:t>Disminución errores </a:t>
+            </a:r>
+            <a:r>
+              <a:rPr lang="es-AR" dirty="0" smtClean="0"/>
+              <a:t>empleados</a:t>
+            </a:r>
+            <a:endParaRPr lang="es-AR" dirty="0"/>
+          </a:p>
+          <a:p>
+            <a:r>
+              <a:rPr lang="es-AR" dirty="0" smtClean="0"/>
+              <a:t>Trato con personal</a:t>
+            </a:r>
+          </a:p>
+          <a:p>
+            <a:r>
+              <a:rPr lang="es-AR" dirty="0" smtClean="0"/>
+              <a:t>Capacitación</a:t>
+            </a:r>
+          </a:p>
+          <a:p>
+            <a:r>
+              <a:rPr lang="es-AR" dirty="0" smtClean="0"/>
+              <a:t>Resistencia al cambio</a:t>
+            </a:r>
+            <a:endParaRPr lang="es-ES" dirty="0"/>
+          </a:p>
+        </p:txBody>
+      </p:sp>
+      <p:pic>
+        <p:nvPicPr>
+          <p:cNvPr id="4" name="Picture 3"/>
+          <p:cNvPicPr>
+            <a:picLocks noChangeAspect="1"/>
+          </p:cNvPicPr>
+          <p:nvPr/>
+        </p:nvPicPr>
+        <p:blipFill>
+          <a:blip r:embed="rId2">
+            <a:extLst>
+              <a:ext uri="{28A0092B-C50C-407E-A947-70E740481C1C}">
+                <a14:useLocalDpi xmlns:a14="http://schemas.microsoft.com/office/drawing/2010/main" val="0"/>
+              </a:ext>
+            </a:extLst>
+          </a:blip>
+          <a:stretch>
+            <a:fillRect/>
+          </a:stretch>
+        </p:blipFill>
+        <p:spPr>
+          <a:xfrm>
+            <a:off x="8419999" y="0"/>
+            <a:ext cx="724001" cy="6858000"/>
+          </a:xfrm>
+          <a:prstGeom prst="rect">
+            <a:avLst/>
+          </a:prstGeom>
+        </p:spPr>
+      </p:pic>
+    </p:spTree>
+    <p:extLst>
+      <p:ext uri="{BB962C8B-B14F-4D97-AF65-F5344CB8AC3E}">
+        <p14:creationId xmlns:p14="http://schemas.microsoft.com/office/powerpoint/2010/main" val="3612777209"/>
+      </p:ext>
+    </p:extLst>
+  </p:cSld>
+  <p:clrMapOvr>
+    <a:masterClrMapping/>
+  </p:clrMapOvr>
+  <p:timing>
+    <p:tnLst>
+      <p:par>
+        <p:cTn id="1" dur="indefinite" restart="never" nodeType="tmRoot"/>
+      </p:par>
+    </p:tnLst>
+  </p:timing>
+</p:sld>
+</file>
+
+<file path=ppt/slides/slide12.xml><?xml version="1.0" encoding="utf-8"?>
+<p:sld xmlns:a="http://schemas.openxmlformats.org/drawingml/2006/main" xmlns:r="http://schemas.openxmlformats.org/officeDocument/2006/relationships" xmlns:p="http://schemas.openxmlformats.org/presentationml/2006/main">
+  <p:cSld>
+    <p:spTree>
+      <p:nvGrpSpPr>
+        <p:cNvPr id="1" name=""/>
+        <p:cNvGrpSpPr/>
+        <p:nvPr/>
+      </p:nvGrpSpPr>
+      <p:grpSpPr>
+        <a:xfrm>
+          <a:off x="0" y="0"/>
+          <a:ext cx="0" cy="0"/>
+          <a:chOff x="0" y="0"/>
+          <a:chExt cx="0" cy="0"/>
+        </a:xfrm>
+      </p:grpSpPr>
+      <p:sp>
+        <p:nvSpPr>
+          <p:cNvPr id="2" name="Title 1"/>
+          <p:cNvSpPr>
+            <a:spLocks noGrp="1"/>
+          </p:cNvSpPr>
+          <p:nvPr>
+            <p:ph type="title"/>
+          </p:nvPr>
+        </p:nvSpPr>
+        <p:spPr>
+          <a:xfrm>
+            <a:off x="179512" y="-27384"/>
+            <a:ext cx="8229600" cy="1143000"/>
+          </a:xfrm>
+        </p:spPr>
+        <p:txBody>
+          <a:bodyPr/>
+          <a:lstStyle/>
+          <a:p>
+            <a:r>
+              <a:rPr lang="es-AR" dirty="0" smtClean="0"/>
+              <a:t>Conclusiones</a:t>
+            </a:r>
+            <a:endParaRPr lang="es-ES" dirty="0"/>
+          </a:p>
+        </p:txBody>
+      </p:sp>
+      <p:sp>
+        <p:nvSpPr>
+          <p:cNvPr id="3" name="Content Placeholder 2"/>
+          <p:cNvSpPr>
+            <a:spLocks noGrp="1"/>
+          </p:cNvSpPr>
+          <p:nvPr>
+            <p:ph idx="1"/>
+          </p:nvPr>
+        </p:nvSpPr>
+        <p:spPr>
+          <a:xfrm>
+            <a:off x="-6423" y="2143397"/>
+            <a:ext cx="7962799" cy="2005683"/>
+          </a:xfrm>
+        </p:spPr>
+        <p:txBody>
+          <a:bodyPr/>
+          <a:lstStyle/>
+          <a:p>
+            <a:r>
+              <a:rPr lang="es-AR" dirty="0" smtClean="0"/>
+              <a:t>Metodología </a:t>
+            </a:r>
+            <a:r>
+              <a:rPr lang="es-AR" dirty="0" err="1" smtClean="0"/>
+              <a:t>Scrum</a:t>
+            </a:r>
+            <a:endParaRPr lang="es-AR" dirty="0" smtClean="0"/>
+          </a:p>
+          <a:p>
+            <a:endParaRPr lang="es-AR" dirty="0" smtClean="0"/>
+          </a:p>
+          <a:p>
+            <a:r>
+              <a:rPr lang="es-AR" dirty="0" smtClean="0"/>
+              <a:t>Tecnologías utilizadas</a:t>
+            </a:r>
+          </a:p>
+          <a:p>
+            <a:endParaRPr lang="es-ES" dirty="0"/>
+          </a:p>
+        </p:txBody>
+      </p:sp>
+      <p:pic>
+        <p:nvPicPr>
+          <p:cNvPr id="4" name="Picture 3"/>
+          <p:cNvPicPr>
+            <a:picLocks noChangeAspect="1"/>
+          </p:cNvPicPr>
+          <p:nvPr/>
+        </p:nvPicPr>
+        <p:blipFill>
+          <a:blip r:embed="rId2">
+            <a:extLst>
+              <a:ext uri="{28A0092B-C50C-407E-A947-70E740481C1C}">
+                <a14:useLocalDpi xmlns:a14="http://schemas.microsoft.com/office/drawing/2010/main" val="0"/>
+              </a:ext>
+            </a:extLst>
+          </a:blip>
+          <a:stretch>
+            <a:fillRect/>
+          </a:stretch>
+        </p:blipFill>
+        <p:spPr>
+          <a:xfrm>
+            <a:off x="8419999" y="0"/>
+            <a:ext cx="724001" cy="6858000"/>
+          </a:xfrm>
+          <a:prstGeom prst="rect">
+            <a:avLst/>
+          </a:prstGeom>
+        </p:spPr>
+      </p:pic>
+    </p:spTree>
+    <p:extLst>
+      <p:ext uri="{BB962C8B-B14F-4D97-AF65-F5344CB8AC3E}">
+        <p14:creationId xmlns:p14="http://schemas.microsoft.com/office/powerpoint/2010/main" val="3720278335"/>
+      </p:ext>
+    </p:extLst>
+  </p:cSld>
+  <p:clrMapOvr>
+    <a:masterClrMapping/>
+  </p:clrMapOvr>
+  <p:timing>
+    <p:tnLst>
+      <p:par>
+        <p:cTn id="1" dur="indefinite" restart="never" nodeType="tmRoot"/>
+      </p:par>
+    </p:tnLst>
+  </p:timing>
+</p:sld>
+</file>
+
+<file path=ppt/slides/slide13.xml><?xml version="1.0" encoding="utf-8"?>
+<p:sld xmlns:a="http://schemas.openxmlformats.org/drawingml/2006/main" xmlns:r="http://schemas.openxmlformats.org/officeDocument/2006/relationships" xmlns:p="http://schemas.openxmlformats.org/presentationml/2006/main">
+  <p:cSld>
+    <p:spTree>
+      <p:nvGrpSpPr>
+        <p:cNvPr id="1" name=""/>
+        <p:cNvGrpSpPr/>
+        <p:nvPr/>
+      </p:nvGrpSpPr>
+      <p:grpSpPr>
+        <a:xfrm>
+          <a:off x="0" y="0"/>
+          <a:ext cx="0" cy="0"/>
+          <a:chOff x="0" y="0"/>
+          <a:chExt cx="0" cy="0"/>
+        </a:xfrm>
+      </p:grpSpPr>
+      <p:sp>
+        <p:nvSpPr>
+          <p:cNvPr id="2" name="Title 1"/>
+          <p:cNvSpPr>
+            <a:spLocks noGrp="1"/>
+          </p:cNvSpPr>
+          <p:nvPr>
+            <p:ph type="title"/>
+          </p:nvPr>
+        </p:nvSpPr>
+        <p:spPr>
+          <a:xfrm>
+            <a:off x="179512" y="-27384"/>
+            <a:ext cx="8229600" cy="1143000"/>
+          </a:xfrm>
+        </p:spPr>
+        <p:txBody>
+          <a:bodyPr/>
+          <a:lstStyle/>
+          <a:p>
+            <a:r>
+              <a:rPr lang="es-AR" dirty="0" smtClean="0"/>
+              <a:t>Preguntas</a:t>
+            </a:r>
+            <a:endParaRPr lang="es-ES" dirty="0"/>
+          </a:p>
+        </p:txBody>
+      </p:sp>
+      <p:pic>
+        <p:nvPicPr>
+          <p:cNvPr id="4" name="Picture 3"/>
+          <p:cNvPicPr>
+            <a:picLocks noChangeAspect="1"/>
+          </p:cNvPicPr>
+          <p:nvPr/>
+        </p:nvPicPr>
+        <p:blipFill>
+          <a:blip r:embed="rId2">
+            <a:extLst>
+              <a:ext uri="{28A0092B-C50C-407E-A947-70E740481C1C}">
+                <a14:useLocalDpi xmlns:a14="http://schemas.microsoft.com/office/drawing/2010/main" val="0"/>
+              </a:ext>
+            </a:extLst>
+          </a:blip>
+          <a:stretch>
+            <a:fillRect/>
+          </a:stretch>
+        </p:blipFill>
+        <p:spPr>
+          <a:xfrm>
+            <a:off x="8419999" y="0"/>
+            <a:ext cx="724001" cy="6858000"/>
+          </a:xfrm>
+          <a:prstGeom prst="rect">
+            <a:avLst/>
+          </a:prstGeom>
+        </p:spPr>
+      </p:pic>
+      <p:pic>
+        <p:nvPicPr>
+          <p:cNvPr id="6" name="Content Placeholder 5"/>
+          <p:cNvPicPr>
+            <a:picLocks noGrp="1" noChangeAspect="1"/>
+          </p:cNvPicPr>
+          <p:nvPr>
+            <p:ph idx="1"/>
+          </p:nvPr>
+        </p:nvPicPr>
+        <p:blipFill>
+          <a:blip r:embed="rId3">
+            <a:extLst>
+              <a:ext uri="{28A0092B-C50C-407E-A947-70E740481C1C}">
+                <a14:useLocalDpi xmlns:a14="http://schemas.microsoft.com/office/drawing/2010/main" val="0"/>
+              </a:ext>
+            </a:extLst>
+          </a:blip>
+          <a:stretch>
+            <a:fillRect/>
+          </a:stretch>
+        </p:blipFill>
+        <p:spPr>
+          <a:xfrm>
+            <a:off x="2339752" y="2348880"/>
+            <a:ext cx="3838575" cy="2838450"/>
+          </a:xfrm>
+        </p:spPr>
+      </p:pic>
+    </p:spTree>
+    <p:extLst>
+      <p:ext uri="{BB962C8B-B14F-4D97-AF65-F5344CB8AC3E}">
+        <p14:creationId xmlns:p14="http://schemas.microsoft.com/office/powerpoint/2010/main" val="862326910"/>
+      </p:ext>
+    </p:extLst>
+  </p:cSld>
+  <p:clrMapOvr>
+    <a:masterClrMapping/>
+  </p:clrMapOvr>
+  <p:timing>
+    <p:tnLst>
+      <p:par>
+        <p:cTn id="1" dur="indefinite" restart="never" nodeType="tmRoot"/>
+      </p:par>
+    </p:tnLst>
+  </p:timing>
+</p:sld>
+</file>
+
+<file path=ppt/slides/slide2.xml><?xml version="1.0" encoding="utf-8"?>
+<p:sld xmlns:a="http://schemas.openxmlformats.org/drawingml/2006/main" xmlns:r="http://schemas.openxmlformats.org/officeDocument/2006/relationships" xmlns:p="http://schemas.openxmlformats.org/presentationml/2006/main">
+  <p:cSld>
+    <p:spTree>
+      <p:nvGrpSpPr>
+        <p:cNvPr id="1" name=""/>
+        <p:cNvGrpSpPr/>
+        <p:nvPr/>
+      </p:nvGrpSpPr>
+      <p:grpSpPr>
+        <a:xfrm>
+          <a:off x="0" y="0"/>
+          <a:ext cx="0" cy="0"/>
+          <a:chOff x="0" y="0"/>
+          <a:chExt cx="0" cy="0"/>
+        </a:xfrm>
+      </p:grpSpPr>
+      <p:sp>
+        <p:nvSpPr>
+          <p:cNvPr id="2" name="Title 1"/>
+          <p:cNvSpPr>
+            <a:spLocks noGrp="1"/>
+          </p:cNvSpPr>
+          <p:nvPr>
+            <p:ph type="title"/>
+          </p:nvPr>
+        </p:nvSpPr>
+        <p:spPr>
+          <a:xfrm>
+            <a:off x="179512" y="-27384"/>
+            <a:ext cx="8229600" cy="1143000"/>
+          </a:xfrm>
+        </p:spPr>
+        <p:txBody>
+          <a:bodyPr/>
+          <a:lstStyle/>
+          <a:p>
+            <a:r>
+              <a:rPr lang="es-AR" dirty="0" smtClean="0"/>
+              <a:t>Índice</a:t>
+            </a:r>
+            <a:endParaRPr lang="es-ES" dirty="0"/>
+          </a:p>
+        </p:txBody>
+      </p:sp>
+      <p:sp>
+        <p:nvSpPr>
+          <p:cNvPr id="3" name="Content Placeholder 2"/>
+          <p:cNvSpPr>
+            <a:spLocks noGrp="1"/>
+          </p:cNvSpPr>
+          <p:nvPr>
+            <p:ph idx="1"/>
+          </p:nvPr>
+        </p:nvSpPr>
+        <p:spPr>
+          <a:xfrm>
+            <a:off x="466190" y="1556792"/>
+            <a:ext cx="7962799" cy="4525963"/>
+          </a:xfrm>
+        </p:spPr>
+        <p:txBody>
+          <a:bodyPr>
+            <a:normAutofit/>
+          </a:bodyPr>
+          <a:lstStyle/>
+          <a:p>
+            <a:endParaRPr lang="es-AR" dirty="0" smtClean="0"/>
+          </a:p>
+          <a:p>
+            <a:r>
+              <a:rPr lang="es-AR" dirty="0" smtClean="0"/>
+              <a:t>Introducción</a:t>
+            </a:r>
+          </a:p>
+          <a:p>
+            <a:r>
+              <a:rPr lang="es-AR" dirty="0" smtClean="0"/>
+              <a:t>Dificultades</a:t>
+            </a:r>
+          </a:p>
+          <a:p>
+            <a:r>
+              <a:rPr lang="es-AR" dirty="0" smtClean="0"/>
+              <a:t>Soluciones</a:t>
+            </a:r>
+          </a:p>
+          <a:p>
+            <a:r>
+              <a:rPr lang="es-AR" dirty="0" smtClean="0"/>
+              <a:t>Experiencia</a:t>
+            </a:r>
+          </a:p>
+          <a:p>
+            <a:r>
+              <a:rPr lang="es-AR" dirty="0" smtClean="0"/>
+              <a:t>Conclusiones</a:t>
+            </a:r>
+          </a:p>
+          <a:p>
+            <a:r>
+              <a:rPr lang="es-AR" dirty="0" smtClean="0"/>
+              <a:t>Video</a:t>
+            </a:r>
+            <a:endParaRPr lang="es-ES" dirty="0"/>
+          </a:p>
+        </p:txBody>
+      </p:sp>
+      <p:pic>
+        <p:nvPicPr>
+          <p:cNvPr id="4" name="Picture 3"/>
+          <p:cNvPicPr>
+            <a:picLocks noChangeAspect="1"/>
+          </p:cNvPicPr>
+          <p:nvPr/>
+        </p:nvPicPr>
+        <p:blipFill>
+          <a:blip r:embed="rId2">
+            <a:extLst>
+              <a:ext uri="{28A0092B-C50C-407E-A947-70E740481C1C}">
+                <a14:useLocalDpi xmlns:a14="http://schemas.microsoft.com/office/drawing/2010/main" val="0"/>
+              </a:ext>
+            </a:extLst>
+          </a:blip>
+          <a:stretch>
+            <a:fillRect/>
+          </a:stretch>
+        </p:blipFill>
+        <p:spPr>
+          <a:xfrm>
+            <a:off x="8419999" y="0"/>
+            <a:ext cx="724001" cy="6858000"/>
+          </a:xfrm>
+          <a:prstGeom prst="rect">
+            <a:avLst/>
+          </a:prstGeom>
+        </p:spPr>
+      </p:pic>
+    </p:spTree>
+    <p:extLst>
+      <p:ext uri="{BB962C8B-B14F-4D97-AF65-F5344CB8AC3E}">
+        <p14:creationId xmlns:p14="http://schemas.microsoft.com/office/powerpoint/2010/main" val="1547018876"/>
+      </p:ext>
+    </p:extLst>
+  </p:cSld>
+  <p:clrMapOvr>
+    <a:masterClrMapping/>
+  </p:clrMapOvr>
+  <p:timing>
+    <p:tnLst>
+      <p:par>
+        <p:cTn id="1" dur="indefinite" restart="never" nodeType="tmRoot"/>
+      </p:par>
+    </p:tnLst>
+  </p:timing>
+</p:sld>
+</file>
+
+<file path=ppt/slides/slide3.xml><?xml version="1.0" encoding="utf-8"?>
+<p:sld xmlns:a="http://schemas.openxmlformats.org/drawingml/2006/main" xmlns:r="http://schemas.openxmlformats.org/officeDocument/2006/relationships" xmlns:p="http://schemas.openxmlformats.org/presentationml/2006/main">
+  <p:cSld>
+    <p:spTree>
+      <p:nvGrpSpPr>
+        <p:cNvPr id="1" name=""/>
+        <p:cNvGrpSpPr/>
+        <p:nvPr/>
+      </p:nvGrpSpPr>
+      <p:grpSpPr>
+        <a:xfrm>
+          <a:off x="0" y="0"/>
+          <a:ext cx="0" cy="0"/>
+          <a:chOff x="0" y="0"/>
+          <a:chExt cx="0" cy="0"/>
+        </a:xfrm>
+      </p:grpSpPr>
+      <p:sp>
+        <p:nvSpPr>
+          <p:cNvPr id="2" name="Title 1"/>
+          <p:cNvSpPr>
+            <a:spLocks noGrp="1"/>
+          </p:cNvSpPr>
+          <p:nvPr>
+            <p:ph type="title"/>
+          </p:nvPr>
+        </p:nvSpPr>
+        <p:spPr>
+          <a:xfrm>
+            <a:off x="179512" y="-27384"/>
+            <a:ext cx="8229600" cy="1143000"/>
+          </a:xfrm>
+        </p:spPr>
+        <p:txBody>
+          <a:bodyPr/>
+          <a:lstStyle/>
+          <a:p>
+            <a:r>
+              <a:rPr lang="es-AR" dirty="0" smtClean="0"/>
+              <a:t>Introducción</a:t>
+            </a:r>
+            <a:endParaRPr lang="es-ES" dirty="0"/>
+          </a:p>
+        </p:txBody>
+      </p:sp>
+      <p:pic>
+        <p:nvPicPr>
+          <p:cNvPr id="4" name="Picture 3"/>
+          <p:cNvPicPr>
+            <a:picLocks noChangeAspect="1"/>
+          </p:cNvPicPr>
+          <p:nvPr/>
+        </p:nvPicPr>
+        <p:blipFill>
+          <a:blip r:embed="rId2">
+            <a:extLst>
+              <a:ext uri="{28A0092B-C50C-407E-A947-70E740481C1C}">
+                <a14:useLocalDpi xmlns:a14="http://schemas.microsoft.com/office/drawing/2010/main" val="0"/>
+              </a:ext>
+            </a:extLst>
+          </a:blip>
+          <a:stretch>
+            <a:fillRect/>
+          </a:stretch>
+        </p:blipFill>
+        <p:spPr>
+          <a:xfrm>
+            <a:off x="8419999" y="0"/>
+            <a:ext cx="724001" cy="6858000"/>
+          </a:xfrm>
+          <a:prstGeom prst="rect">
+            <a:avLst/>
+          </a:prstGeom>
+        </p:spPr>
+      </p:pic>
+      <p:pic>
+        <p:nvPicPr>
+          <p:cNvPr id="5" name="Picture 4"/>
+          <p:cNvPicPr>
+            <a:picLocks noChangeAspect="1"/>
+          </p:cNvPicPr>
+          <p:nvPr/>
+        </p:nvPicPr>
+        <p:blipFill>
+          <a:blip r:embed="rId3" cstate="print">
+            <a:extLst>
+              <a:ext uri="{28A0092B-C50C-407E-A947-70E740481C1C}">
+                <a14:useLocalDpi xmlns:a14="http://schemas.microsoft.com/office/drawing/2010/main" val="0"/>
+              </a:ext>
+            </a:extLst>
+          </a:blip>
+          <a:stretch>
+            <a:fillRect/>
+          </a:stretch>
+        </p:blipFill>
+        <p:spPr>
+          <a:xfrm>
+            <a:off x="2254842" y="1844824"/>
+            <a:ext cx="1597078" cy="1713430"/>
+          </a:xfrm>
+          <a:prstGeom prst="rect">
+            <a:avLst/>
+          </a:prstGeom>
+        </p:spPr>
+      </p:pic>
+      <p:pic>
+        <p:nvPicPr>
+          <p:cNvPr id="7" name="Picture 6"/>
+          <p:cNvPicPr>
+            <a:picLocks noChangeAspect="1"/>
+          </p:cNvPicPr>
+          <p:nvPr/>
+        </p:nvPicPr>
+        <p:blipFill>
+          <a:blip r:embed="rId3" cstate="print">
+            <a:extLst>
+              <a:ext uri="{28A0092B-C50C-407E-A947-70E740481C1C}">
+                <a14:useLocalDpi xmlns:a14="http://schemas.microsoft.com/office/drawing/2010/main" val="0"/>
+              </a:ext>
+            </a:extLst>
+          </a:blip>
+          <a:stretch>
+            <a:fillRect/>
+          </a:stretch>
+        </p:blipFill>
+        <p:spPr>
+          <a:xfrm>
+            <a:off x="2242855" y="4666890"/>
+            <a:ext cx="1602068" cy="1718784"/>
+          </a:xfrm>
+          <a:prstGeom prst="rect">
+            <a:avLst/>
+          </a:prstGeom>
+        </p:spPr>
+      </p:pic>
+      <p:pic>
+        <p:nvPicPr>
+          <p:cNvPr id="8" name="Picture 7"/>
+          <p:cNvPicPr>
+            <a:picLocks noChangeAspect="1"/>
+          </p:cNvPicPr>
+          <p:nvPr/>
+        </p:nvPicPr>
+        <p:blipFill>
+          <a:blip r:embed="rId3" cstate="print">
+            <a:extLst>
+              <a:ext uri="{28A0092B-C50C-407E-A947-70E740481C1C}">
+                <a14:useLocalDpi xmlns:a14="http://schemas.microsoft.com/office/drawing/2010/main" val="0"/>
+              </a:ext>
+            </a:extLst>
+          </a:blip>
+          <a:stretch>
+            <a:fillRect/>
+          </a:stretch>
+        </p:blipFill>
+        <p:spPr>
+          <a:xfrm>
+            <a:off x="5977848" y="2965602"/>
+            <a:ext cx="1762504" cy="1890908"/>
+          </a:xfrm>
+          <a:prstGeom prst="rect">
+            <a:avLst/>
+          </a:prstGeom>
+        </p:spPr>
+      </p:pic>
+      <p:cxnSp>
+        <p:nvCxnSpPr>
+          <p:cNvPr id="13" name="Straight Arrow Connector 12"/>
+          <p:cNvCxnSpPr/>
+          <p:nvPr/>
+        </p:nvCxnSpPr>
+        <p:spPr>
+          <a:xfrm flipV="1">
+            <a:off x="4355976" y="4894415"/>
+            <a:ext cx="1152128" cy="631076"/>
+          </a:xfrm>
+          <a:prstGeom prst="straightConnector1">
+            <a:avLst/>
+          </a:prstGeom>
+          <a:ln>
+            <a:tailEnd type="arrow"/>
+          </a:ln>
+        </p:spPr>
+        <p:style>
+          <a:lnRef idx="1">
+            <a:schemeClr val="accent1"/>
+          </a:lnRef>
+          <a:fillRef idx="0">
+            <a:schemeClr val="accent1"/>
+          </a:fillRef>
+          <a:effectRef idx="0">
+            <a:schemeClr val="accent1"/>
+          </a:effectRef>
+          <a:fontRef idx="minor">
+            <a:schemeClr val="tx1"/>
+          </a:fontRef>
+        </p:style>
+      </p:cxnSp>
+      <p:cxnSp>
+        <p:nvCxnSpPr>
+          <p:cNvPr id="15" name="Straight Arrow Connector 14"/>
+          <p:cNvCxnSpPr/>
+          <p:nvPr/>
+        </p:nvCxnSpPr>
+        <p:spPr>
+          <a:xfrm flipH="1" flipV="1">
+            <a:off x="4355976" y="3217321"/>
+            <a:ext cx="1224136" cy="432049"/>
+          </a:xfrm>
+          <a:prstGeom prst="straightConnector1">
+            <a:avLst/>
+          </a:prstGeom>
+          <a:ln>
+            <a:tailEnd type="arrow"/>
+          </a:ln>
+        </p:spPr>
+        <p:style>
+          <a:lnRef idx="1">
+            <a:schemeClr val="accent1"/>
+          </a:lnRef>
+          <a:fillRef idx="0">
+            <a:schemeClr val="accent1"/>
+          </a:fillRef>
+          <a:effectRef idx="0">
+            <a:schemeClr val="accent1"/>
+          </a:effectRef>
+          <a:fontRef idx="minor">
+            <a:schemeClr val="tx1"/>
+          </a:fontRef>
+        </p:style>
+      </p:cxnSp>
+      <p:cxnSp>
+        <p:nvCxnSpPr>
+          <p:cNvPr id="17" name="Straight Arrow Connector 16"/>
+          <p:cNvCxnSpPr/>
+          <p:nvPr/>
+        </p:nvCxnSpPr>
+        <p:spPr>
+          <a:xfrm>
+            <a:off x="6859100" y="5209953"/>
+            <a:ext cx="0" cy="815681"/>
+          </a:xfrm>
+          <a:prstGeom prst="straightConnector1">
+            <a:avLst/>
+          </a:prstGeom>
+          <a:ln>
+            <a:tailEnd type="arrow"/>
+          </a:ln>
+        </p:spPr>
+        <p:style>
+          <a:lnRef idx="1">
+            <a:schemeClr val="accent1"/>
+          </a:lnRef>
+          <a:fillRef idx="0">
+            <a:schemeClr val="accent1"/>
+          </a:fillRef>
+          <a:effectRef idx="0">
+            <a:schemeClr val="accent1"/>
+          </a:effectRef>
+          <a:fontRef idx="minor">
+            <a:schemeClr val="tx1"/>
+          </a:fontRef>
+        </p:style>
+      </p:cxnSp>
+      <p:cxnSp>
+        <p:nvCxnSpPr>
+          <p:cNvPr id="19" name="Straight Arrow Connector 18"/>
+          <p:cNvCxnSpPr/>
+          <p:nvPr/>
+        </p:nvCxnSpPr>
+        <p:spPr>
+          <a:xfrm flipV="1">
+            <a:off x="6859100" y="5209953"/>
+            <a:ext cx="0" cy="815681"/>
+          </a:xfrm>
+          <a:prstGeom prst="straightConnector1">
+            <a:avLst/>
+          </a:prstGeom>
+          <a:ln>
+            <a:tailEnd type="arrow"/>
+          </a:ln>
+        </p:spPr>
+        <p:style>
+          <a:lnRef idx="1">
+            <a:schemeClr val="accent1"/>
+          </a:lnRef>
+          <a:fillRef idx="0">
+            <a:schemeClr val="accent1"/>
+          </a:fillRef>
+          <a:effectRef idx="0">
+            <a:schemeClr val="accent1"/>
+          </a:effectRef>
+          <a:fontRef idx="minor">
+            <a:schemeClr val="tx1"/>
+          </a:fontRef>
+        </p:style>
+      </p:cxnSp>
+      <p:sp>
+        <p:nvSpPr>
+          <p:cNvPr id="30" name="TextBox 29"/>
+          <p:cNvSpPr txBox="1"/>
+          <p:nvPr/>
+        </p:nvSpPr>
+        <p:spPr>
+          <a:xfrm>
+            <a:off x="6444197" y="6097642"/>
+            <a:ext cx="838884" cy="369332"/>
+          </a:xfrm>
+          <a:prstGeom prst="rect">
+            <a:avLst/>
+          </a:prstGeom>
+          <a:noFill/>
+        </p:spPr>
+        <p:txBody>
+          <a:bodyPr wrap="none" rtlCol="0">
+            <a:spAutoFit/>
+          </a:bodyPr>
+          <a:lstStyle/>
+          <a:p>
+            <a:r>
+              <a:rPr lang="es-AR" dirty="0" smtClean="0"/>
+              <a:t>Cliente</a:t>
+            </a:r>
+            <a:endParaRPr lang="es-ES" dirty="0"/>
+          </a:p>
+        </p:txBody>
+      </p:sp>
+      <p:sp>
+        <p:nvSpPr>
+          <p:cNvPr id="31" name="TextBox 30"/>
+          <p:cNvSpPr txBox="1"/>
+          <p:nvPr/>
+        </p:nvSpPr>
+        <p:spPr>
+          <a:xfrm>
+            <a:off x="2242855" y="6300028"/>
+            <a:ext cx="2480103" cy="369332"/>
+          </a:xfrm>
+          <a:prstGeom prst="rect">
+            <a:avLst/>
+          </a:prstGeom>
+          <a:noFill/>
+        </p:spPr>
+        <p:txBody>
+          <a:bodyPr wrap="none" rtlCol="0">
+            <a:spAutoFit/>
+          </a:bodyPr>
+          <a:lstStyle/>
+          <a:p>
+            <a:r>
+              <a:rPr lang="es-AR" dirty="0" smtClean="0"/>
+              <a:t>Compactadora (Caseros)</a:t>
+            </a:r>
+            <a:endParaRPr lang="es-ES" dirty="0"/>
+          </a:p>
+        </p:txBody>
+      </p:sp>
+      <p:cxnSp>
+        <p:nvCxnSpPr>
+          <p:cNvPr id="38" name="Straight Arrow Connector 37"/>
+          <p:cNvCxnSpPr/>
+          <p:nvPr/>
+        </p:nvCxnSpPr>
+        <p:spPr>
+          <a:xfrm flipH="1">
+            <a:off x="1403648" y="2921909"/>
+            <a:ext cx="673356" cy="0"/>
+          </a:xfrm>
+          <a:prstGeom prst="straightConnector1">
+            <a:avLst/>
+          </a:prstGeom>
+          <a:ln>
+            <a:tailEnd type="arrow"/>
+          </a:ln>
+        </p:spPr>
+        <p:style>
+          <a:lnRef idx="1">
+            <a:schemeClr val="accent1"/>
+          </a:lnRef>
+          <a:fillRef idx="0">
+            <a:schemeClr val="accent1"/>
+          </a:fillRef>
+          <a:effectRef idx="0">
+            <a:schemeClr val="accent1"/>
+          </a:effectRef>
+          <a:fontRef idx="minor">
+            <a:schemeClr val="tx1"/>
+          </a:fontRef>
+        </p:style>
+      </p:cxnSp>
+      <p:sp>
+        <p:nvSpPr>
+          <p:cNvPr id="41" name="TextBox 40"/>
+          <p:cNvSpPr txBox="1"/>
+          <p:nvPr/>
+        </p:nvSpPr>
+        <p:spPr>
+          <a:xfrm>
+            <a:off x="348740" y="2708920"/>
+            <a:ext cx="838884" cy="369332"/>
+          </a:xfrm>
+          <a:prstGeom prst="rect">
+            <a:avLst/>
+          </a:prstGeom>
+          <a:noFill/>
+        </p:spPr>
+        <p:txBody>
+          <a:bodyPr wrap="none" rtlCol="0">
+            <a:spAutoFit/>
+          </a:bodyPr>
+          <a:lstStyle/>
+          <a:p>
+            <a:r>
+              <a:rPr lang="es-AR" dirty="0" smtClean="0"/>
+              <a:t>Cliente</a:t>
+            </a:r>
+            <a:endParaRPr lang="es-ES" dirty="0"/>
+          </a:p>
+        </p:txBody>
+      </p:sp>
+      <p:sp>
+        <p:nvSpPr>
+          <p:cNvPr id="43" name="TextBox 42"/>
+          <p:cNvSpPr txBox="1"/>
+          <p:nvPr/>
+        </p:nvSpPr>
+        <p:spPr>
+          <a:xfrm>
+            <a:off x="5796136" y="4729490"/>
+            <a:ext cx="2174250" cy="369332"/>
+          </a:xfrm>
+          <a:prstGeom prst="rect">
+            <a:avLst/>
+          </a:prstGeom>
+          <a:noFill/>
+        </p:spPr>
+        <p:txBody>
+          <a:bodyPr wrap="none" rtlCol="0">
+            <a:spAutoFit/>
+          </a:bodyPr>
+          <a:lstStyle/>
+          <a:p>
+            <a:r>
+              <a:rPr lang="es-AR" dirty="0" smtClean="0"/>
+              <a:t>F. Bobinas (</a:t>
+            </a:r>
+            <a:r>
+              <a:rPr lang="es-AR" dirty="0" err="1" smtClean="0"/>
+              <a:t>Baradero</a:t>
+            </a:r>
+            <a:r>
+              <a:rPr lang="es-AR" dirty="0" smtClean="0"/>
+              <a:t>)</a:t>
+            </a:r>
+            <a:endParaRPr lang="es-ES" dirty="0"/>
+          </a:p>
+        </p:txBody>
+      </p:sp>
+      <p:sp>
+        <p:nvSpPr>
+          <p:cNvPr id="44" name="TextBox 43"/>
+          <p:cNvSpPr txBox="1"/>
+          <p:nvPr/>
+        </p:nvSpPr>
+        <p:spPr>
+          <a:xfrm>
+            <a:off x="2123728" y="3659447"/>
+            <a:ext cx="2155398" cy="369332"/>
+          </a:xfrm>
+          <a:prstGeom prst="rect">
+            <a:avLst/>
+          </a:prstGeom>
+          <a:noFill/>
+        </p:spPr>
+        <p:txBody>
+          <a:bodyPr wrap="none" rtlCol="0">
+            <a:spAutoFit/>
+          </a:bodyPr>
+          <a:lstStyle/>
+          <a:p>
+            <a:r>
+              <a:rPr lang="es-AR" dirty="0" smtClean="0"/>
+              <a:t>F. Producto (Caseros)</a:t>
+            </a:r>
+            <a:endParaRPr lang="es-ES" dirty="0"/>
+          </a:p>
+        </p:txBody>
+      </p:sp>
+      <p:sp>
+        <p:nvSpPr>
+          <p:cNvPr id="45" name="TextBox 44"/>
+          <p:cNvSpPr txBox="1"/>
+          <p:nvPr/>
+        </p:nvSpPr>
+        <p:spPr>
+          <a:xfrm>
+            <a:off x="107504" y="1249596"/>
+            <a:ext cx="2158668" cy="523220"/>
+          </a:xfrm>
+          <a:prstGeom prst="rect">
+            <a:avLst/>
+          </a:prstGeom>
+          <a:noFill/>
+        </p:spPr>
+        <p:txBody>
+          <a:bodyPr wrap="none" rtlCol="0">
+            <a:spAutoFit/>
+          </a:bodyPr>
+          <a:lstStyle/>
+          <a:p>
+            <a:r>
+              <a:rPr lang="es-AR" sz="2800" dirty="0" err="1" smtClean="0"/>
+              <a:t>Baradero</a:t>
+            </a:r>
+            <a:r>
+              <a:rPr lang="es-AR" sz="2800" dirty="0" smtClean="0"/>
+              <a:t> S.A.</a:t>
+            </a:r>
+            <a:endParaRPr lang="es-ES" sz="2800" dirty="0"/>
+          </a:p>
+        </p:txBody>
+      </p:sp>
+      <p:cxnSp>
+        <p:nvCxnSpPr>
+          <p:cNvPr id="47" name="Straight Arrow Connector 46"/>
+          <p:cNvCxnSpPr/>
+          <p:nvPr/>
+        </p:nvCxnSpPr>
+        <p:spPr>
+          <a:xfrm>
+            <a:off x="1403648" y="5949280"/>
+            <a:ext cx="720080" cy="0"/>
+          </a:xfrm>
+          <a:prstGeom prst="straightConnector1">
+            <a:avLst/>
+          </a:prstGeom>
+          <a:ln>
+            <a:tailEnd type="arrow"/>
+          </a:ln>
+        </p:spPr>
+        <p:style>
+          <a:lnRef idx="1">
+            <a:schemeClr val="accent1"/>
+          </a:lnRef>
+          <a:fillRef idx="0">
+            <a:schemeClr val="accent1"/>
+          </a:fillRef>
+          <a:effectRef idx="0">
+            <a:schemeClr val="accent1"/>
+          </a:effectRef>
+          <a:fontRef idx="minor">
+            <a:schemeClr val="tx1"/>
+          </a:fontRef>
+        </p:style>
+      </p:cxnSp>
+      <p:sp>
+        <p:nvSpPr>
+          <p:cNvPr id="48" name="TextBox 47"/>
+          <p:cNvSpPr txBox="1"/>
+          <p:nvPr/>
+        </p:nvSpPr>
+        <p:spPr>
+          <a:xfrm>
+            <a:off x="605423" y="5764614"/>
+            <a:ext cx="586443" cy="369332"/>
+          </a:xfrm>
+          <a:prstGeom prst="rect">
+            <a:avLst/>
+          </a:prstGeom>
+          <a:noFill/>
+        </p:spPr>
+        <p:txBody>
+          <a:bodyPr wrap="none" rtlCol="0">
+            <a:spAutoFit/>
+          </a:bodyPr>
+          <a:lstStyle/>
+          <a:p>
+            <a:r>
+              <a:rPr lang="es-AR" dirty="0" smtClean="0"/>
+              <a:t>M.P.</a:t>
+            </a:r>
+            <a:endParaRPr lang="es-ES" dirty="0"/>
+          </a:p>
+        </p:txBody>
+      </p:sp>
+    </p:spTree>
+    <p:extLst>
+      <p:ext uri="{BB962C8B-B14F-4D97-AF65-F5344CB8AC3E}">
+        <p14:creationId xmlns:p14="http://schemas.microsoft.com/office/powerpoint/2010/main" val="3358033053"/>
+      </p:ext>
+    </p:extLst>
+  </p:cSld>
+  <p:clrMapOvr>
+    <a:masterClrMapping/>
+  </p:clrMapOvr>
+  <p:timing>
+    <p:tnLst>
+      <p:par>
+        <p:cTn id="1" dur="indefinite" restart="never" nodeType="tmRoot"/>
+      </p:par>
+    </p:tnLst>
+  </p:timing>
+</p:sld>
+</file>
+
+<file path=ppt/slides/slide4.xml><?xml version="1.0" encoding="utf-8"?>
+<p:sld xmlns:a="http://schemas.openxmlformats.org/drawingml/2006/main" xmlns:r="http://schemas.openxmlformats.org/officeDocument/2006/relationships" xmlns:p="http://schemas.openxmlformats.org/presentationml/2006/main">
+  <p:cSld>
+    <p:spTree>
+      <p:nvGrpSpPr>
+        <p:cNvPr id="1" name=""/>
+        <p:cNvGrpSpPr/>
+        <p:nvPr/>
+      </p:nvGrpSpPr>
+      <p:grpSpPr>
+        <a:xfrm>
+          <a:off x="0" y="0"/>
+          <a:ext cx="0" cy="0"/>
+          <a:chOff x="0" y="0"/>
+          <a:chExt cx="0" cy="0"/>
+        </a:xfrm>
+      </p:grpSpPr>
+      <p:sp>
+        <p:nvSpPr>
+          <p:cNvPr id="2" name="Title 1"/>
+          <p:cNvSpPr>
+            <a:spLocks noGrp="1"/>
+          </p:cNvSpPr>
+          <p:nvPr>
+            <p:ph type="title"/>
+          </p:nvPr>
+        </p:nvSpPr>
+        <p:spPr>
+          <a:xfrm>
+            <a:off x="179512" y="53752"/>
+            <a:ext cx="8229600" cy="1143000"/>
+          </a:xfrm>
+        </p:spPr>
+        <p:txBody>
+          <a:bodyPr/>
+          <a:lstStyle/>
+          <a:p>
+            <a:r>
+              <a:rPr lang="es-AR" dirty="0" smtClean="0"/>
+              <a:t>Introducción</a:t>
+            </a:r>
+            <a:endParaRPr lang="es-ES" dirty="0"/>
+          </a:p>
+        </p:txBody>
+      </p:sp>
+      <p:pic>
+        <p:nvPicPr>
+          <p:cNvPr id="5" name="Content Placeholder 4"/>
+          <p:cNvPicPr>
+            <a:picLocks noGrp="1" noChangeAspect="1"/>
+          </p:cNvPicPr>
+          <p:nvPr>
+            <p:ph idx="1"/>
+          </p:nvPr>
+        </p:nvPicPr>
+        <p:blipFill>
+          <a:blip r:embed="rId2">
+            <a:extLst>
+              <a:ext uri="{28A0092B-C50C-407E-A947-70E740481C1C}">
+                <a14:useLocalDpi xmlns:a14="http://schemas.microsoft.com/office/drawing/2010/main" val="0"/>
+              </a:ext>
+            </a:extLst>
+          </a:blip>
+          <a:stretch>
+            <a:fillRect/>
+          </a:stretch>
+        </p:blipFill>
+        <p:spPr>
+          <a:xfrm>
+            <a:off x="2267744" y="2142148"/>
+            <a:ext cx="4469214" cy="4239180"/>
+          </a:xfrm>
+        </p:spPr>
+      </p:pic>
+      <p:pic>
+        <p:nvPicPr>
+          <p:cNvPr id="4" name="Picture 3"/>
+          <p:cNvPicPr>
+            <a:picLocks noChangeAspect="1"/>
+          </p:cNvPicPr>
+          <p:nvPr/>
+        </p:nvPicPr>
+        <p:blipFill>
+          <a:blip r:embed="rId3">
+            <a:extLst>
+              <a:ext uri="{28A0092B-C50C-407E-A947-70E740481C1C}">
+                <a14:useLocalDpi xmlns:a14="http://schemas.microsoft.com/office/drawing/2010/main" val="0"/>
+              </a:ext>
+            </a:extLst>
+          </a:blip>
+          <a:stretch>
+            <a:fillRect/>
+          </a:stretch>
+        </p:blipFill>
+        <p:spPr>
+          <a:xfrm>
+            <a:off x="8419999" y="0"/>
+            <a:ext cx="724001" cy="6858000"/>
+          </a:xfrm>
+          <a:prstGeom prst="rect">
+            <a:avLst/>
+          </a:prstGeom>
+        </p:spPr>
+      </p:pic>
+      <p:sp>
+        <p:nvSpPr>
+          <p:cNvPr id="3" name="TextBox 2"/>
+          <p:cNvSpPr txBox="1"/>
+          <p:nvPr/>
+        </p:nvSpPr>
+        <p:spPr>
+          <a:xfrm>
+            <a:off x="341341" y="1772816"/>
+            <a:ext cx="926344" cy="369332"/>
+          </a:xfrm>
+          <a:prstGeom prst="rect">
+            <a:avLst/>
+          </a:prstGeom>
+          <a:noFill/>
+        </p:spPr>
+        <p:txBody>
+          <a:bodyPr wrap="none" rtlCol="0">
+            <a:spAutoFit/>
+          </a:bodyPr>
+          <a:lstStyle/>
+          <a:p>
+            <a:r>
+              <a:rPr lang="es-AR" u="sng" dirty="0" smtClean="0"/>
+              <a:t>Proceso</a:t>
+            </a:r>
+            <a:endParaRPr lang="es-ES" u="sng" dirty="0"/>
+          </a:p>
+        </p:txBody>
+      </p:sp>
+    </p:spTree>
+    <p:extLst>
+      <p:ext uri="{BB962C8B-B14F-4D97-AF65-F5344CB8AC3E}">
+        <p14:creationId xmlns:p14="http://schemas.microsoft.com/office/powerpoint/2010/main" val="1547018876"/>
+      </p:ext>
+    </p:extLst>
+  </p:cSld>
+  <p:clrMapOvr>
+    <a:masterClrMapping/>
+  </p:clrMapOvr>
+  <p:timing>
+    <p:tnLst>
+      <p:par>
+        <p:cTn id="1" dur="indefinite" restart="never" nodeType="tmRoot"/>
+      </p:par>
+    </p:tnLst>
+  </p:timing>
+</p:sld>
+</file>
+
+<file path=ppt/slides/slide5.xml><?xml version="1.0" encoding="utf-8"?>
+<p:sld xmlns:a="http://schemas.openxmlformats.org/drawingml/2006/main" xmlns:r="http://schemas.openxmlformats.org/officeDocument/2006/relationships" xmlns:p="http://schemas.openxmlformats.org/presentationml/2006/main">
+  <p:cSld>
+    <p:spTree>
+      <p:nvGrpSpPr>
+        <p:cNvPr id="1" name=""/>
+        <p:cNvGrpSpPr/>
+        <p:nvPr/>
+      </p:nvGrpSpPr>
+      <p:grpSpPr>
+        <a:xfrm>
+          <a:off x="0" y="0"/>
+          <a:ext cx="0" cy="0"/>
+          <a:chOff x="0" y="0"/>
+          <a:chExt cx="0" cy="0"/>
+        </a:xfrm>
+      </p:grpSpPr>
+      <p:sp>
+        <p:nvSpPr>
+          <p:cNvPr id="2" name="Title 1"/>
+          <p:cNvSpPr>
+            <a:spLocks noGrp="1"/>
+          </p:cNvSpPr>
+          <p:nvPr>
+            <p:ph type="title"/>
+          </p:nvPr>
+        </p:nvSpPr>
+        <p:spPr>
+          <a:xfrm>
+            <a:off x="179512" y="-27384"/>
+            <a:ext cx="8229600" cy="1143000"/>
+          </a:xfrm>
+        </p:spPr>
+        <p:txBody>
+          <a:bodyPr/>
+          <a:lstStyle/>
+          <a:p>
+            <a:r>
+              <a:rPr lang="es-AR" dirty="0" smtClean="0"/>
+              <a:t>Introducción</a:t>
+            </a:r>
+            <a:endParaRPr lang="es-ES" dirty="0"/>
+          </a:p>
+        </p:txBody>
+      </p:sp>
+      <p:pic>
+        <p:nvPicPr>
+          <p:cNvPr id="5" name="Content Placeholder 4"/>
+          <p:cNvPicPr>
+            <a:picLocks noGrp="1" noChangeAspect="1"/>
+          </p:cNvPicPr>
+          <p:nvPr>
+            <p:ph idx="1"/>
+          </p:nvPr>
+        </p:nvPicPr>
+        <p:blipFill>
+          <a:blip r:embed="rId2" cstate="print">
+            <a:extLst>
+              <a:ext uri="{28A0092B-C50C-407E-A947-70E740481C1C}">
+                <a14:useLocalDpi xmlns:a14="http://schemas.microsoft.com/office/drawing/2010/main" val="0"/>
+              </a:ext>
+            </a:extLst>
+          </a:blip>
+          <a:stretch>
+            <a:fillRect/>
+          </a:stretch>
+        </p:blipFill>
+        <p:spPr>
+          <a:xfrm>
+            <a:off x="2483768" y="3789040"/>
+            <a:ext cx="1368152" cy="1297732"/>
+          </a:xfrm>
+        </p:spPr>
+      </p:pic>
+      <p:pic>
+        <p:nvPicPr>
+          <p:cNvPr id="4" name="Picture 3"/>
+          <p:cNvPicPr>
+            <a:picLocks noChangeAspect="1"/>
+          </p:cNvPicPr>
+          <p:nvPr/>
+        </p:nvPicPr>
+        <p:blipFill>
+          <a:blip r:embed="rId3">
+            <a:extLst>
+              <a:ext uri="{28A0092B-C50C-407E-A947-70E740481C1C}">
+                <a14:useLocalDpi xmlns:a14="http://schemas.microsoft.com/office/drawing/2010/main" val="0"/>
+              </a:ext>
+            </a:extLst>
+          </a:blip>
+          <a:stretch>
+            <a:fillRect/>
+          </a:stretch>
+        </p:blipFill>
+        <p:spPr>
+          <a:xfrm>
+            <a:off x="8419999" y="0"/>
+            <a:ext cx="724001" cy="6858000"/>
+          </a:xfrm>
+          <a:prstGeom prst="rect">
+            <a:avLst/>
+          </a:prstGeom>
+        </p:spPr>
+      </p:pic>
+      <p:pic>
+        <p:nvPicPr>
+          <p:cNvPr id="6" name="Picture 5"/>
+          <p:cNvPicPr>
+            <a:picLocks noChangeAspect="1"/>
+          </p:cNvPicPr>
+          <p:nvPr/>
+        </p:nvPicPr>
+        <p:blipFill>
+          <a:blip r:embed="rId4" cstate="print">
+            <a:extLst>
+              <a:ext uri="{28A0092B-C50C-407E-A947-70E740481C1C}">
+                <a14:useLocalDpi xmlns:a14="http://schemas.microsoft.com/office/drawing/2010/main" val="0"/>
+              </a:ext>
+            </a:extLst>
+          </a:blip>
+          <a:stretch>
+            <a:fillRect/>
+          </a:stretch>
+        </p:blipFill>
+        <p:spPr>
+          <a:xfrm>
+            <a:off x="2591780" y="2216592"/>
+            <a:ext cx="1152128" cy="1236064"/>
+          </a:xfrm>
+          <a:prstGeom prst="rect">
+            <a:avLst/>
+          </a:prstGeom>
+        </p:spPr>
+      </p:pic>
+      <p:pic>
+        <p:nvPicPr>
+          <p:cNvPr id="7" name="Content Placeholder 4"/>
+          <p:cNvPicPr>
+            <a:picLocks noChangeAspect="1"/>
+          </p:cNvPicPr>
+          <p:nvPr/>
+        </p:nvPicPr>
+        <p:blipFill>
+          <a:blip r:embed="rId2" cstate="print">
+            <a:extLst>
+              <a:ext uri="{28A0092B-C50C-407E-A947-70E740481C1C}">
+                <a14:useLocalDpi xmlns:a14="http://schemas.microsoft.com/office/drawing/2010/main" val="0"/>
+              </a:ext>
+            </a:extLst>
+          </a:blip>
+          <a:stretch>
+            <a:fillRect/>
+          </a:stretch>
+        </p:blipFill>
+        <p:spPr>
+          <a:xfrm>
+            <a:off x="5904148" y="3834717"/>
+            <a:ext cx="1368152" cy="1297732"/>
+          </a:xfrm>
+          <a:prstGeom prst="rect">
+            <a:avLst/>
+          </a:prstGeom>
+        </p:spPr>
+      </p:pic>
+      <p:pic>
+        <p:nvPicPr>
+          <p:cNvPr id="8" name="Picture 7"/>
+          <p:cNvPicPr>
+            <a:picLocks noChangeAspect="1"/>
+          </p:cNvPicPr>
+          <p:nvPr/>
+        </p:nvPicPr>
+        <p:blipFill>
+          <a:blip r:embed="rId4" cstate="print">
+            <a:extLst>
+              <a:ext uri="{28A0092B-C50C-407E-A947-70E740481C1C}">
+                <a14:useLocalDpi xmlns:a14="http://schemas.microsoft.com/office/drawing/2010/main" val="0"/>
+              </a:ext>
+            </a:extLst>
+          </a:blip>
+          <a:stretch>
+            <a:fillRect/>
+          </a:stretch>
+        </p:blipFill>
+        <p:spPr>
+          <a:xfrm>
+            <a:off x="6012160" y="2204864"/>
+            <a:ext cx="1152128" cy="1236064"/>
+          </a:xfrm>
+          <a:prstGeom prst="rect">
+            <a:avLst/>
+          </a:prstGeom>
+        </p:spPr>
+      </p:pic>
+      <p:cxnSp>
+        <p:nvCxnSpPr>
+          <p:cNvPr id="9" name="Straight Arrow Connector 8"/>
+          <p:cNvCxnSpPr/>
+          <p:nvPr/>
+        </p:nvCxnSpPr>
+        <p:spPr>
+          <a:xfrm flipH="1">
+            <a:off x="1882420" y="2996952"/>
+            <a:ext cx="457332" cy="0"/>
+          </a:xfrm>
+          <a:prstGeom prst="straightConnector1">
+            <a:avLst/>
+          </a:prstGeom>
+          <a:ln>
+            <a:tailEnd type="arrow"/>
+          </a:ln>
+        </p:spPr>
+        <p:style>
+          <a:lnRef idx="1">
+            <a:schemeClr val="accent1"/>
+          </a:lnRef>
+          <a:fillRef idx="0">
+            <a:schemeClr val="accent1"/>
+          </a:fillRef>
+          <a:effectRef idx="0">
+            <a:schemeClr val="accent1"/>
+          </a:effectRef>
+          <a:fontRef idx="minor">
+            <a:schemeClr val="tx1"/>
+          </a:fontRef>
+        </p:style>
+      </p:cxnSp>
+      <p:sp>
+        <p:nvSpPr>
+          <p:cNvPr id="10" name="TextBox 9"/>
+          <p:cNvSpPr txBox="1"/>
+          <p:nvPr/>
+        </p:nvSpPr>
+        <p:spPr>
+          <a:xfrm>
+            <a:off x="971600" y="2858452"/>
+            <a:ext cx="694868" cy="276999"/>
+          </a:xfrm>
+          <a:prstGeom prst="rect">
+            <a:avLst/>
+          </a:prstGeom>
+          <a:noFill/>
+        </p:spPr>
+        <p:txBody>
+          <a:bodyPr wrap="square" rtlCol="0">
+            <a:spAutoFit/>
+          </a:bodyPr>
+          <a:lstStyle/>
+          <a:p>
+            <a:r>
+              <a:rPr lang="es-AR" sz="1200" dirty="0" smtClean="0"/>
+              <a:t>Cliente</a:t>
+            </a:r>
+            <a:endParaRPr lang="es-ES" sz="1200" dirty="0"/>
+          </a:p>
+        </p:txBody>
+      </p:sp>
+      <p:sp>
+        <p:nvSpPr>
+          <p:cNvPr id="11" name="TextBox 10"/>
+          <p:cNvSpPr txBox="1"/>
+          <p:nvPr/>
+        </p:nvSpPr>
+        <p:spPr>
+          <a:xfrm>
+            <a:off x="6181388" y="6104329"/>
+            <a:ext cx="694868" cy="276999"/>
+          </a:xfrm>
+          <a:prstGeom prst="rect">
+            <a:avLst/>
+          </a:prstGeom>
+          <a:noFill/>
+        </p:spPr>
+        <p:txBody>
+          <a:bodyPr wrap="square" rtlCol="0">
+            <a:spAutoFit/>
+          </a:bodyPr>
+          <a:lstStyle/>
+          <a:p>
+            <a:r>
+              <a:rPr lang="es-AR" sz="1200" dirty="0" smtClean="0"/>
+              <a:t> Cliente</a:t>
+            </a:r>
+            <a:endParaRPr lang="es-ES" sz="1200" dirty="0"/>
+          </a:p>
+        </p:txBody>
+      </p:sp>
+      <p:cxnSp>
+        <p:nvCxnSpPr>
+          <p:cNvPr id="13" name="Straight Arrow Connector 12"/>
+          <p:cNvCxnSpPr/>
+          <p:nvPr/>
+        </p:nvCxnSpPr>
+        <p:spPr>
+          <a:xfrm flipV="1">
+            <a:off x="6528822" y="5373216"/>
+            <a:ext cx="0" cy="542508"/>
+          </a:xfrm>
+          <a:prstGeom prst="straightConnector1">
+            <a:avLst/>
+          </a:prstGeom>
+          <a:ln>
+            <a:tailEnd type="arrow"/>
+          </a:ln>
+        </p:spPr>
+        <p:style>
+          <a:lnRef idx="1">
+            <a:schemeClr val="accent1"/>
+          </a:lnRef>
+          <a:fillRef idx="0">
+            <a:schemeClr val="accent1"/>
+          </a:fillRef>
+          <a:effectRef idx="0">
+            <a:schemeClr val="accent1"/>
+          </a:effectRef>
+          <a:fontRef idx="minor">
+            <a:schemeClr val="tx1"/>
+          </a:fontRef>
+        </p:style>
+      </p:cxnSp>
+      <p:cxnSp>
+        <p:nvCxnSpPr>
+          <p:cNvPr id="15" name="Straight Arrow Connector 14"/>
+          <p:cNvCxnSpPr/>
+          <p:nvPr/>
+        </p:nvCxnSpPr>
+        <p:spPr>
+          <a:xfrm>
+            <a:off x="6528822" y="5373216"/>
+            <a:ext cx="0" cy="542508"/>
+          </a:xfrm>
+          <a:prstGeom prst="straightConnector1">
+            <a:avLst/>
+          </a:prstGeom>
+          <a:ln>
+            <a:tailEnd type="arrow"/>
+          </a:ln>
+        </p:spPr>
+        <p:style>
+          <a:lnRef idx="1">
+            <a:schemeClr val="accent1"/>
+          </a:lnRef>
+          <a:fillRef idx="0">
+            <a:schemeClr val="accent1"/>
+          </a:fillRef>
+          <a:effectRef idx="0">
+            <a:schemeClr val="accent1"/>
+          </a:effectRef>
+          <a:fontRef idx="minor">
+            <a:schemeClr val="tx1"/>
+          </a:fontRef>
+        </p:style>
+      </p:cxnSp>
+      <p:cxnSp>
+        <p:nvCxnSpPr>
+          <p:cNvPr id="19" name="Straight Arrow Connector 18"/>
+          <p:cNvCxnSpPr/>
+          <p:nvPr/>
+        </p:nvCxnSpPr>
+        <p:spPr>
+          <a:xfrm flipH="1">
+            <a:off x="4355976" y="2996952"/>
+            <a:ext cx="936104" cy="0"/>
+          </a:xfrm>
+          <a:prstGeom prst="straightConnector1">
+            <a:avLst/>
+          </a:prstGeom>
+          <a:ln>
+            <a:tailEnd type="arrow"/>
+          </a:ln>
+        </p:spPr>
+        <p:style>
+          <a:lnRef idx="1">
+            <a:schemeClr val="accent1"/>
+          </a:lnRef>
+          <a:fillRef idx="0">
+            <a:schemeClr val="accent1"/>
+          </a:fillRef>
+          <a:effectRef idx="0">
+            <a:schemeClr val="accent1"/>
+          </a:effectRef>
+          <a:fontRef idx="minor">
+            <a:schemeClr val="tx1"/>
+          </a:fontRef>
+        </p:style>
+      </p:cxnSp>
+      <p:sp>
+        <p:nvSpPr>
+          <p:cNvPr id="21" name="TextBox 20"/>
+          <p:cNvSpPr txBox="1"/>
+          <p:nvPr/>
+        </p:nvSpPr>
+        <p:spPr>
+          <a:xfrm>
+            <a:off x="2352920" y="3440928"/>
+            <a:ext cx="1499000" cy="276999"/>
+          </a:xfrm>
+          <a:prstGeom prst="rect">
+            <a:avLst/>
+          </a:prstGeom>
+          <a:noFill/>
+        </p:spPr>
+        <p:txBody>
+          <a:bodyPr wrap="none" rtlCol="0">
+            <a:spAutoFit/>
+          </a:bodyPr>
+          <a:lstStyle/>
+          <a:p>
+            <a:r>
+              <a:rPr lang="es-AR" sz="1200" dirty="0" smtClean="0"/>
+              <a:t>F. Producto (Caseros)</a:t>
+            </a:r>
+            <a:endParaRPr lang="es-ES" sz="1200" dirty="0"/>
+          </a:p>
+        </p:txBody>
+      </p:sp>
+      <p:sp>
+        <p:nvSpPr>
+          <p:cNvPr id="22" name="TextBox 21"/>
+          <p:cNvSpPr txBox="1"/>
+          <p:nvPr/>
+        </p:nvSpPr>
+        <p:spPr>
+          <a:xfrm>
+            <a:off x="5728447" y="3438696"/>
+            <a:ext cx="1507849" cy="276999"/>
+          </a:xfrm>
+          <a:prstGeom prst="rect">
+            <a:avLst/>
+          </a:prstGeom>
+          <a:noFill/>
+        </p:spPr>
+        <p:txBody>
+          <a:bodyPr wrap="none" rtlCol="0">
+            <a:spAutoFit/>
+          </a:bodyPr>
+          <a:lstStyle/>
+          <a:p>
+            <a:r>
+              <a:rPr lang="es-AR" sz="1200" dirty="0" smtClean="0"/>
+              <a:t>F. Bobinas (</a:t>
+            </a:r>
+            <a:r>
+              <a:rPr lang="es-AR" sz="1200" dirty="0" err="1" smtClean="0"/>
+              <a:t>Baradero</a:t>
+            </a:r>
+            <a:r>
+              <a:rPr lang="es-AR" sz="1200" dirty="0" smtClean="0"/>
+              <a:t>)</a:t>
+            </a:r>
+            <a:endParaRPr lang="es-ES" sz="1200" dirty="0"/>
+          </a:p>
+        </p:txBody>
+      </p:sp>
+    </p:spTree>
+    <p:extLst>
+      <p:ext uri="{BB962C8B-B14F-4D97-AF65-F5344CB8AC3E}">
+        <p14:creationId xmlns:p14="http://schemas.microsoft.com/office/powerpoint/2010/main" val="3247069331"/>
+      </p:ext>
+    </p:extLst>
+  </p:cSld>
+  <p:clrMapOvr>
+    <a:masterClrMapping/>
+  </p:clrMapOvr>
+  <p:timing>
+    <p:tnLst>
+      <p:par>
+        <p:cTn id="1" dur="indefinite" restart="never" nodeType="tmRoot"/>
+      </p:par>
+    </p:tnLst>
+  </p:timing>
+</p:sld>
+</file>
+
+<file path=ppt/slides/slide6.xml><?xml version="1.0" encoding="utf-8"?>
+<p:sld xmlns:a="http://schemas.openxmlformats.org/drawingml/2006/main" xmlns:r="http://schemas.openxmlformats.org/officeDocument/2006/relationships" xmlns:p="http://schemas.openxmlformats.org/presentationml/2006/main">
+  <p:cSld>
+    <p:spTree>
+      <p:nvGrpSpPr>
+        <p:cNvPr id="1" name=""/>
+        <p:cNvGrpSpPr/>
+        <p:nvPr/>
+      </p:nvGrpSpPr>
+      <p:grpSpPr>
+        <a:xfrm>
+          <a:off x="0" y="0"/>
+          <a:ext cx="0" cy="0"/>
+          <a:chOff x="0" y="0"/>
+          <a:chExt cx="0" cy="0"/>
+        </a:xfrm>
+      </p:grpSpPr>
+      <p:sp>
+        <p:nvSpPr>
+          <p:cNvPr id="2" name="Title 1"/>
+          <p:cNvSpPr>
+            <a:spLocks noGrp="1"/>
+          </p:cNvSpPr>
+          <p:nvPr>
+            <p:ph type="title"/>
+          </p:nvPr>
+        </p:nvSpPr>
+        <p:spPr>
+          <a:xfrm>
+            <a:off x="179512" y="44624"/>
+            <a:ext cx="8229600" cy="1143000"/>
+          </a:xfrm>
+        </p:spPr>
+        <p:txBody>
+          <a:bodyPr>
+            <a:normAutofit/>
+          </a:bodyPr>
+          <a:lstStyle/>
+          <a:p>
+            <a:r>
+              <a:rPr lang="es-AR" dirty="0" smtClean="0"/>
+              <a:t>Dificultades</a:t>
+            </a:r>
+            <a:endParaRPr lang="es-ES" dirty="0"/>
+          </a:p>
+        </p:txBody>
+      </p:sp>
+      <p:sp>
+        <p:nvSpPr>
+          <p:cNvPr id="3" name="Content Placeholder 2"/>
+          <p:cNvSpPr>
+            <a:spLocks noGrp="1"/>
+          </p:cNvSpPr>
+          <p:nvPr>
+            <p:ph idx="1"/>
+          </p:nvPr>
+        </p:nvSpPr>
+        <p:spPr>
+          <a:xfrm>
+            <a:off x="539552" y="2276872"/>
+            <a:ext cx="7880447" cy="3384376"/>
+          </a:xfrm>
+        </p:spPr>
+        <p:txBody>
+          <a:bodyPr>
+            <a:normAutofit lnSpcReduction="10000"/>
+          </a:bodyPr>
+          <a:lstStyle/>
+          <a:p>
+            <a:r>
+              <a:rPr lang="es-AR" dirty="0" smtClean="0"/>
+              <a:t>Entender al cliente</a:t>
+            </a:r>
+          </a:p>
+          <a:p>
+            <a:r>
+              <a:rPr lang="es-AR" dirty="0" smtClean="0"/>
+              <a:t>Toma de </a:t>
+            </a:r>
+            <a:r>
+              <a:rPr lang="es-AR" dirty="0" smtClean="0"/>
+              <a:t>datos</a:t>
+            </a:r>
+          </a:p>
+          <a:p>
+            <a:r>
+              <a:rPr lang="es-AR" dirty="0" smtClean="0"/>
+              <a:t>Ambientales</a:t>
+            </a:r>
+            <a:endParaRPr lang="es-AR" dirty="0" smtClean="0"/>
+          </a:p>
+          <a:p>
+            <a:r>
+              <a:rPr lang="es-AR" dirty="0" smtClean="0"/>
+              <a:t>Tiempo limitado</a:t>
+            </a:r>
+          </a:p>
+          <a:p>
+            <a:r>
+              <a:rPr lang="es-AR" dirty="0" smtClean="0"/>
+              <a:t>Conector </a:t>
+            </a:r>
+            <a:r>
+              <a:rPr lang="es-AR" dirty="0" smtClean="0"/>
+              <a:t>RS232 (Balanza)</a:t>
+            </a:r>
+            <a:endParaRPr lang="es-AR" dirty="0" smtClean="0"/>
+          </a:p>
+          <a:p>
+            <a:r>
+              <a:rPr lang="es-AR" dirty="0" smtClean="0"/>
+              <a:t>Interacción obreros</a:t>
+            </a:r>
+            <a:endParaRPr lang="es-AR" dirty="0" smtClean="0"/>
+          </a:p>
+          <a:p>
+            <a:endParaRPr lang="es-ES" dirty="0"/>
+          </a:p>
+        </p:txBody>
+      </p:sp>
+      <p:pic>
+        <p:nvPicPr>
+          <p:cNvPr id="5" name="Picture 4"/>
+          <p:cNvPicPr>
+            <a:picLocks noChangeAspect="1"/>
+          </p:cNvPicPr>
+          <p:nvPr/>
+        </p:nvPicPr>
+        <p:blipFill>
+          <a:blip r:embed="rId2">
+            <a:extLst>
+              <a:ext uri="{28A0092B-C50C-407E-A947-70E740481C1C}">
+                <a14:useLocalDpi xmlns:a14="http://schemas.microsoft.com/office/drawing/2010/main" val="0"/>
+              </a:ext>
+            </a:extLst>
+          </a:blip>
+          <a:stretch>
+            <a:fillRect/>
+          </a:stretch>
+        </p:blipFill>
+        <p:spPr>
+          <a:xfrm>
+            <a:off x="8419999" y="0"/>
+            <a:ext cx="724001" cy="6858000"/>
+          </a:xfrm>
+          <a:prstGeom prst="rect">
+            <a:avLst/>
+          </a:prstGeom>
+        </p:spPr>
+      </p:pic>
+    </p:spTree>
+    <p:extLst>
+      <p:ext uri="{BB962C8B-B14F-4D97-AF65-F5344CB8AC3E}">
+        <p14:creationId xmlns:p14="http://schemas.microsoft.com/office/powerpoint/2010/main" val="1803874707"/>
+      </p:ext>
+    </p:extLst>
+  </p:cSld>
+  <p:clrMapOvr>
+    <a:masterClrMapping/>
+  </p:clrMapOvr>
+  <p:timing>
+    <p:tnLst>
+      <p:par>
+        <p:cTn id="1" dur="indefinite" restart="never" nodeType="tmRoot"/>
+      </p:par>
+    </p:tnLst>
+  </p:timing>
+</p:sld>
+</file>
+
+<file path=ppt/slides/slide7.xml><?xml version="1.0" encoding="utf-8"?>
+<p:sld xmlns:a="http://schemas.openxmlformats.org/drawingml/2006/main" xmlns:r="http://schemas.openxmlformats.org/officeDocument/2006/relationships" xmlns:p="http://schemas.openxmlformats.org/presentationml/2006/main">
+  <p:cSld>
+    <p:spTree>
+      <p:nvGrpSpPr>
+        <p:cNvPr id="1" name=""/>
+        <p:cNvGrpSpPr/>
+        <p:nvPr/>
+      </p:nvGrpSpPr>
+      <p:grpSpPr>
+        <a:xfrm>
+          <a:off x="0" y="0"/>
+          <a:ext cx="0" cy="0"/>
+          <a:chOff x="0" y="0"/>
+          <a:chExt cx="0" cy="0"/>
+        </a:xfrm>
+      </p:grpSpPr>
+      <p:sp>
+        <p:nvSpPr>
+          <p:cNvPr id="2" name="Title 1"/>
+          <p:cNvSpPr>
+            <a:spLocks noGrp="1"/>
+          </p:cNvSpPr>
+          <p:nvPr>
+            <p:ph type="title"/>
+          </p:nvPr>
+        </p:nvSpPr>
+        <p:spPr>
+          <a:xfrm>
+            <a:off x="179512" y="-27384"/>
+            <a:ext cx="8229600" cy="1143000"/>
+          </a:xfrm>
+        </p:spPr>
+        <p:txBody>
+          <a:bodyPr/>
+          <a:lstStyle/>
+          <a:p>
+            <a:r>
+              <a:rPr lang="es-AR" dirty="0" smtClean="0"/>
+              <a:t>Soluciones</a:t>
+            </a:r>
+            <a:endParaRPr lang="es-ES" dirty="0"/>
+          </a:p>
+        </p:txBody>
+      </p:sp>
+      <p:sp>
+        <p:nvSpPr>
+          <p:cNvPr id="3" name="Content Placeholder 2"/>
+          <p:cNvSpPr>
+            <a:spLocks noGrp="1"/>
+          </p:cNvSpPr>
+          <p:nvPr>
+            <p:ph idx="1"/>
+          </p:nvPr>
+        </p:nvSpPr>
+        <p:spPr>
+          <a:xfrm>
+            <a:off x="35496" y="2204864"/>
+            <a:ext cx="7962799" cy="864096"/>
+          </a:xfrm>
+        </p:spPr>
+        <p:txBody>
+          <a:bodyPr>
+            <a:normAutofit fontScale="85000" lnSpcReduction="20000"/>
+          </a:bodyPr>
+          <a:lstStyle/>
+          <a:p>
+            <a:endParaRPr lang="es-AR" dirty="0" smtClean="0"/>
+          </a:p>
+          <a:p>
+            <a:r>
+              <a:rPr lang="es-AR" dirty="0" smtClean="0"/>
+              <a:t>Hacer </a:t>
+            </a:r>
+            <a:r>
+              <a:rPr lang="es-AR" dirty="0" smtClean="0"/>
+              <a:t>muchas preguntas =&gt; diagramas</a:t>
+            </a:r>
+          </a:p>
+          <a:p>
+            <a:endParaRPr lang="es-AR" dirty="0" smtClean="0"/>
+          </a:p>
+          <a:p>
+            <a:endParaRPr lang="es-ES" dirty="0"/>
+          </a:p>
+        </p:txBody>
+      </p:sp>
+      <p:pic>
+        <p:nvPicPr>
+          <p:cNvPr id="4" name="Picture 3"/>
+          <p:cNvPicPr>
+            <a:picLocks noChangeAspect="1"/>
+          </p:cNvPicPr>
+          <p:nvPr/>
+        </p:nvPicPr>
+        <p:blipFill>
+          <a:blip r:embed="rId2">
+            <a:extLst>
+              <a:ext uri="{28A0092B-C50C-407E-A947-70E740481C1C}">
+                <a14:useLocalDpi xmlns:a14="http://schemas.microsoft.com/office/drawing/2010/main" val="0"/>
+              </a:ext>
+            </a:extLst>
+          </a:blip>
+          <a:stretch>
+            <a:fillRect/>
+          </a:stretch>
+        </p:blipFill>
+        <p:spPr>
+          <a:xfrm>
+            <a:off x="8419999" y="0"/>
+            <a:ext cx="724001" cy="6858000"/>
+          </a:xfrm>
+          <a:prstGeom prst="rect">
+            <a:avLst/>
+          </a:prstGeom>
+        </p:spPr>
+      </p:pic>
+      <p:pic>
+        <p:nvPicPr>
+          <p:cNvPr id="6" name="Picture 5"/>
+          <p:cNvPicPr>
+            <a:picLocks noChangeAspect="1"/>
+          </p:cNvPicPr>
+          <p:nvPr/>
+        </p:nvPicPr>
+        <p:blipFill>
+          <a:blip r:embed="rId3">
+            <a:extLst>
+              <a:ext uri="{28A0092B-C50C-407E-A947-70E740481C1C}">
+                <a14:useLocalDpi xmlns:a14="http://schemas.microsoft.com/office/drawing/2010/main" val="0"/>
+              </a:ext>
+            </a:extLst>
+          </a:blip>
+          <a:stretch>
+            <a:fillRect/>
+          </a:stretch>
+        </p:blipFill>
+        <p:spPr>
+          <a:xfrm>
+            <a:off x="1779399" y="3212976"/>
+            <a:ext cx="4824536" cy="3159820"/>
+          </a:xfrm>
+          <a:prstGeom prst="rect">
+            <a:avLst/>
+          </a:prstGeom>
+        </p:spPr>
+      </p:pic>
+      <p:sp>
+        <p:nvSpPr>
+          <p:cNvPr id="7" name="TextBox 6"/>
+          <p:cNvSpPr txBox="1"/>
+          <p:nvPr/>
+        </p:nvSpPr>
+        <p:spPr>
+          <a:xfrm>
+            <a:off x="2339752" y="1556792"/>
+            <a:ext cx="3744416" cy="784830"/>
+          </a:xfrm>
+          <a:prstGeom prst="rect">
+            <a:avLst/>
+          </a:prstGeom>
+          <a:noFill/>
+        </p:spPr>
+        <p:txBody>
+          <a:bodyPr wrap="square" rtlCol="0">
+            <a:spAutoFit/>
+          </a:bodyPr>
+          <a:lstStyle/>
+          <a:p>
+            <a:pPr lvl="0" algn="ctr"/>
+            <a:r>
+              <a:rPr lang="es-AR" sz="2700" u="sng" dirty="0">
+                <a:solidFill>
+                  <a:prstClr val="black"/>
+                </a:solidFill>
+              </a:rPr>
+              <a:t>Entender al cliente</a:t>
+            </a:r>
+          </a:p>
+          <a:p>
+            <a:endParaRPr lang="es-ES" dirty="0"/>
+          </a:p>
+        </p:txBody>
+      </p:sp>
+    </p:spTree>
+    <p:extLst>
+      <p:ext uri="{BB962C8B-B14F-4D97-AF65-F5344CB8AC3E}">
+        <p14:creationId xmlns:p14="http://schemas.microsoft.com/office/powerpoint/2010/main" val="1547018876"/>
+      </p:ext>
+    </p:extLst>
+  </p:cSld>
+  <p:clrMapOvr>
+    <a:masterClrMapping/>
+  </p:clrMapOvr>
+  <p:timing>
+    <p:tnLst>
+      <p:par>
+        <p:cTn id="1" dur="indefinite" restart="never" nodeType="tmRoot"/>
+      </p:par>
+    </p:tnLst>
+  </p:timing>
+</p:sld>
+</file>
+
+<file path=ppt/slides/slide8.xml><?xml version="1.0" encoding="utf-8"?>
+<p:sld xmlns:a="http://schemas.openxmlformats.org/drawingml/2006/main" xmlns:r="http://schemas.openxmlformats.org/officeDocument/2006/relationships" xmlns:p="http://schemas.openxmlformats.org/presentationml/2006/main">
+  <p:cSld>
+    <p:spTree>
+      <p:nvGrpSpPr>
+        <p:cNvPr id="1" name=""/>
+        <p:cNvGrpSpPr/>
+        <p:nvPr/>
+      </p:nvGrpSpPr>
+      <p:grpSpPr>
+        <a:xfrm>
+          <a:off x="0" y="0"/>
+          <a:ext cx="0" cy="0"/>
+          <a:chOff x="0" y="0"/>
+          <a:chExt cx="0" cy="0"/>
+        </a:xfrm>
+      </p:grpSpPr>
+      <p:sp>
+        <p:nvSpPr>
+          <p:cNvPr id="2" name="Title 1"/>
+          <p:cNvSpPr>
+            <a:spLocks noGrp="1"/>
+          </p:cNvSpPr>
+          <p:nvPr>
+            <p:ph type="title"/>
+          </p:nvPr>
+        </p:nvSpPr>
+        <p:spPr>
+          <a:xfrm>
+            <a:off x="179512" y="-27384"/>
+            <a:ext cx="8229600" cy="1143000"/>
+          </a:xfrm>
+        </p:spPr>
+        <p:txBody>
+          <a:bodyPr/>
+          <a:lstStyle/>
+          <a:p>
+            <a:r>
+              <a:rPr lang="es-AR" dirty="0" smtClean="0"/>
+              <a:t>Soluciones</a:t>
+            </a:r>
+            <a:endParaRPr lang="es-ES" dirty="0"/>
+          </a:p>
+        </p:txBody>
+      </p:sp>
+      <p:sp>
+        <p:nvSpPr>
+          <p:cNvPr id="3" name="Content Placeholder 2"/>
+          <p:cNvSpPr>
+            <a:spLocks noGrp="1"/>
+          </p:cNvSpPr>
+          <p:nvPr>
+            <p:ph idx="1"/>
+          </p:nvPr>
+        </p:nvSpPr>
+        <p:spPr>
+          <a:xfrm>
+            <a:off x="35496" y="2924944"/>
+            <a:ext cx="7962799" cy="1008112"/>
+          </a:xfrm>
+        </p:spPr>
+        <p:txBody>
+          <a:bodyPr>
+            <a:normAutofit fontScale="92500" lnSpcReduction="10000"/>
+          </a:bodyPr>
+          <a:lstStyle/>
+          <a:p>
+            <a:r>
+              <a:rPr lang="es-AR" dirty="0" smtClean="0"/>
+              <a:t>Propuesta </a:t>
+            </a:r>
+            <a:r>
+              <a:rPr lang="es-AR" dirty="0" smtClean="0"/>
+              <a:t>código de barra =&gt; código </a:t>
+            </a:r>
+            <a:r>
+              <a:rPr lang="es-AR" dirty="0" smtClean="0"/>
+              <a:t>QR</a:t>
+            </a:r>
+          </a:p>
+          <a:p>
+            <a:r>
+              <a:rPr lang="es-AR" dirty="0"/>
+              <a:t>Analizar el contexto</a:t>
+            </a:r>
+          </a:p>
+          <a:p>
+            <a:endParaRPr lang="es-AR" dirty="0" smtClean="0"/>
+          </a:p>
+          <a:p>
+            <a:endParaRPr lang="es-AR" dirty="0" smtClean="0"/>
+          </a:p>
+          <a:p>
+            <a:endParaRPr lang="es-ES" dirty="0"/>
+          </a:p>
+        </p:txBody>
+      </p:sp>
+      <p:pic>
+        <p:nvPicPr>
+          <p:cNvPr id="4" name="Picture 3"/>
+          <p:cNvPicPr>
+            <a:picLocks noChangeAspect="1"/>
+          </p:cNvPicPr>
+          <p:nvPr/>
+        </p:nvPicPr>
+        <p:blipFill>
+          <a:blip r:embed="rId2">
+            <a:extLst>
+              <a:ext uri="{28A0092B-C50C-407E-A947-70E740481C1C}">
+                <a14:useLocalDpi xmlns:a14="http://schemas.microsoft.com/office/drawing/2010/main" val="0"/>
+              </a:ext>
+            </a:extLst>
+          </a:blip>
+          <a:stretch>
+            <a:fillRect/>
+          </a:stretch>
+        </p:blipFill>
+        <p:spPr>
+          <a:xfrm>
+            <a:off x="8419999" y="0"/>
+            <a:ext cx="724001" cy="6858000"/>
+          </a:xfrm>
+          <a:prstGeom prst="rect">
+            <a:avLst/>
+          </a:prstGeom>
+        </p:spPr>
+      </p:pic>
+      <p:pic>
+        <p:nvPicPr>
+          <p:cNvPr id="5" name="Content Placeholder 5"/>
+          <p:cNvPicPr>
+            <a:picLocks noChangeAspect="1"/>
+          </p:cNvPicPr>
+          <p:nvPr/>
+        </p:nvPicPr>
+        <p:blipFill>
+          <a:blip r:embed="rId3">
+            <a:extLst>
+              <a:ext uri="{28A0092B-C50C-407E-A947-70E740481C1C}">
+                <a14:useLocalDpi xmlns:a14="http://schemas.microsoft.com/office/drawing/2010/main" val="0"/>
+              </a:ext>
+            </a:extLst>
+          </a:blip>
+          <a:stretch>
+            <a:fillRect/>
+          </a:stretch>
+        </p:blipFill>
+        <p:spPr>
+          <a:xfrm>
+            <a:off x="323528" y="4406927"/>
+            <a:ext cx="7848872" cy="1614361"/>
+          </a:xfrm>
+          <a:prstGeom prst="rect">
+            <a:avLst/>
+          </a:prstGeom>
+        </p:spPr>
+      </p:pic>
+      <p:sp>
+        <p:nvSpPr>
+          <p:cNvPr id="6" name="Rectangle 5"/>
+          <p:cNvSpPr/>
+          <p:nvPr/>
+        </p:nvSpPr>
+        <p:spPr>
+          <a:xfrm>
+            <a:off x="2195736" y="1497558"/>
+            <a:ext cx="4572000" cy="923330"/>
+          </a:xfrm>
+          <a:prstGeom prst="rect">
+            <a:avLst/>
+          </a:prstGeom>
+        </p:spPr>
+        <p:txBody>
+          <a:bodyPr>
+            <a:spAutoFit/>
+          </a:bodyPr>
+          <a:lstStyle/>
+          <a:p>
+            <a:pPr algn="ctr"/>
+            <a:r>
+              <a:rPr lang="es-AR" sz="2700" u="sng" dirty="0"/>
+              <a:t>Toma de datos</a:t>
+            </a:r>
+          </a:p>
+          <a:p>
+            <a:pPr algn="ctr"/>
+            <a:r>
+              <a:rPr lang="es-AR" sz="2700" u="sng" dirty="0"/>
+              <a:t>Ambientales</a:t>
+            </a:r>
+          </a:p>
+        </p:txBody>
+      </p:sp>
+    </p:spTree>
+    <p:extLst>
+      <p:ext uri="{BB962C8B-B14F-4D97-AF65-F5344CB8AC3E}">
+        <p14:creationId xmlns:p14="http://schemas.microsoft.com/office/powerpoint/2010/main" val="1075864010"/>
+      </p:ext>
+    </p:extLst>
+  </p:cSld>
+  <p:clrMapOvr>
+    <a:masterClrMapping/>
+  </p:clrMapOvr>
+  <p:timing>
+    <p:tnLst>
+      <p:par>
+        <p:cTn id="1" dur="indefinite" restart="never" nodeType="tmRoot"/>
+      </p:par>
+    </p:tnLst>
+  </p:timing>
+</p:sld>
+</file>
+
+<file path=ppt/slides/slide9.xml><?xml version="1.0" encoding="utf-8"?>
+<p:sld xmlns:a="http://schemas.openxmlformats.org/drawingml/2006/main" xmlns:r="http://schemas.openxmlformats.org/officeDocument/2006/relationships" xmlns:p="http://schemas.openxmlformats.org/presentationml/2006/main">
+  <p:cSld>
+    <p:spTree>
+      <p:nvGrpSpPr>
+        <p:cNvPr id="1" name=""/>
+        <p:cNvGrpSpPr/>
+        <p:nvPr/>
+      </p:nvGrpSpPr>
+      <p:grpSpPr>
+        <a:xfrm>
+          <a:off x="0" y="0"/>
+          <a:ext cx="0" cy="0"/>
+          <a:chOff x="0" y="0"/>
+          <a:chExt cx="0" cy="0"/>
+        </a:xfrm>
+      </p:grpSpPr>
+      <p:sp>
+        <p:nvSpPr>
+          <p:cNvPr id="2" name="Title 1"/>
+          <p:cNvSpPr>
+            <a:spLocks noGrp="1"/>
+          </p:cNvSpPr>
+          <p:nvPr>
+            <p:ph type="title"/>
+          </p:nvPr>
+        </p:nvSpPr>
+        <p:spPr>
+          <a:xfrm>
+            <a:off x="179512" y="-27384"/>
+            <a:ext cx="8229600" cy="1143000"/>
+          </a:xfrm>
+        </p:spPr>
+        <p:txBody>
+          <a:bodyPr/>
+          <a:lstStyle/>
+          <a:p>
+            <a:r>
+              <a:rPr lang="es-AR" dirty="0" smtClean="0"/>
+              <a:t>Soluciones</a:t>
+            </a:r>
+            <a:endParaRPr lang="es-ES" dirty="0"/>
+          </a:p>
+        </p:txBody>
+      </p:sp>
+      <p:sp>
+        <p:nvSpPr>
+          <p:cNvPr id="3" name="Content Placeholder 2"/>
+          <p:cNvSpPr>
+            <a:spLocks noGrp="1"/>
+          </p:cNvSpPr>
+          <p:nvPr>
+            <p:ph idx="1"/>
+          </p:nvPr>
+        </p:nvSpPr>
+        <p:spPr>
+          <a:xfrm>
+            <a:off x="35496" y="2564904"/>
+            <a:ext cx="7962799" cy="1440160"/>
+          </a:xfrm>
+        </p:spPr>
+        <p:txBody>
+          <a:bodyPr/>
+          <a:lstStyle/>
+          <a:p>
+            <a:r>
+              <a:rPr lang="es-AR" dirty="0"/>
+              <a:t>Ir preparado a cada reunión</a:t>
+            </a:r>
+          </a:p>
+          <a:p>
+            <a:endParaRPr lang="es-AR" dirty="0" smtClean="0"/>
+          </a:p>
+          <a:p>
+            <a:endParaRPr lang="es-ES" dirty="0"/>
+          </a:p>
+        </p:txBody>
+      </p:sp>
+      <p:pic>
+        <p:nvPicPr>
+          <p:cNvPr id="4" name="Picture 3"/>
+          <p:cNvPicPr>
+            <a:picLocks noChangeAspect="1"/>
+          </p:cNvPicPr>
+          <p:nvPr/>
+        </p:nvPicPr>
+        <p:blipFill>
+          <a:blip r:embed="rId2">
+            <a:extLst>
+              <a:ext uri="{28A0092B-C50C-407E-A947-70E740481C1C}">
+                <a14:useLocalDpi xmlns:a14="http://schemas.microsoft.com/office/drawing/2010/main" val="0"/>
+              </a:ext>
+            </a:extLst>
+          </a:blip>
+          <a:stretch>
+            <a:fillRect/>
+          </a:stretch>
+        </p:blipFill>
+        <p:spPr>
+          <a:xfrm>
+            <a:off x="8419999" y="0"/>
+            <a:ext cx="724001" cy="6858000"/>
+          </a:xfrm>
+          <a:prstGeom prst="rect">
+            <a:avLst/>
+          </a:prstGeom>
+        </p:spPr>
+      </p:pic>
+      <p:pic>
+        <p:nvPicPr>
+          <p:cNvPr id="5" name="Picture 4"/>
+          <p:cNvPicPr>
+            <a:picLocks noChangeAspect="1"/>
+          </p:cNvPicPr>
+          <p:nvPr/>
+        </p:nvPicPr>
+        <p:blipFill>
+          <a:blip r:embed="rId3">
+            <a:extLst>
+              <a:ext uri="{28A0092B-C50C-407E-A947-70E740481C1C}">
+                <a14:useLocalDpi xmlns:a14="http://schemas.microsoft.com/office/drawing/2010/main" val="0"/>
+              </a:ext>
+            </a:extLst>
+          </a:blip>
+          <a:stretch>
+            <a:fillRect/>
+          </a:stretch>
+        </p:blipFill>
+        <p:spPr>
+          <a:xfrm>
+            <a:off x="3081766" y="3933056"/>
+            <a:ext cx="2876952" cy="2200582"/>
+          </a:xfrm>
+          <a:prstGeom prst="rect">
+            <a:avLst/>
+          </a:prstGeom>
+        </p:spPr>
+      </p:pic>
+      <p:sp>
+        <p:nvSpPr>
+          <p:cNvPr id="6" name="Rectangle 5"/>
+          <p:cNvSpPr/>
+          <p:nvPr/>
+        </p:nvSpPr>
+        <p:spPr>
+          <a:xfrm>
+            <a:off x="3131840" y="1628800"/>
+            <a:ext cx="2482346" cy="507831"/>
+          </a:xfrm>
+          <a:prstGeom prst="rect">
+            <a:avLst/>
+          </a:prstGeom>
+        </p:spPr>
+        <p:txBody>
+          <a:bodyPr wrap="none">
+            <a:spAutoFit/>
+          </a:bodyPr>
+          <a:lstStyle/>
+          <a:p>
+            <a:r>
+              <a:rPr lang="es-AR" sz="2700" u="sng" dirty="0"/>
+              <a:t>Tiempo limitado</a:t>
+            </a:r>
+          </a:p>
+        </p:txBody>
+      </p:sp>
+    </p:spTree>
+    <p:extLst>
+      <p:ext uri="{BB962C8B-B14F-4D97-AF65-F5344CB8AC3E}">
+        <p14:creationId xmlns:p14="http://schemas.microsoft.com/office/powerpoint/2010/main" val="2649866490"/>
+      </p:ext>
+    </p:extLst>
+  </p:cSld>
+  <p:clrMapOvr>
+    <a:masterClrMapping/>
+  </p:clrMapOvr>
+  <p:timing>
+    <p:tnLst>
+      <p:par>
+        <p:cTn id="1" dur="indefinite" restart="never" nodeType="tmRoot"/>
+      </p:par>
+    </p:tnLst>
+  </p:timing>
 </p:sld>
 </file>
 

</xml_diff>

<commit_message>
Subo finalizacion del sprint 10 con su documentacion.
</commit_message>
<xml_diff>
--- a/Presentacion/Presentacion Final.pptx
+++ b/Presentacion/Presentacion Final.pptx
@@ -17,7 +17,8 @@
     <p:sldId id="264" r:id="rId11"/>
     <p:sldId id="257" r:id="rId12"/>
     <p:sldId id="258" r:id="rId13"/>
-    <p:sldId id="267" r:id="rId14"/>
+    <p:sldId id="269" r:id="rId14"/>
+    <p:sldId id="267" r:id="rId15"/>
   </p:sldIdLst>
   <p:sldSz cx="9144000" cy="6858000" type="screen4x3"/>
   <p:notesSz cx="6858000" cy="9144000"/>
@@ -300,7 +301,7 @@
           <a:p>
             <a:fld id="{D2DCFC82-683F-4A30-9D41-F91D66C01B0C}" type="datetimeFigureOut">
               <a:rPr lang="es-ES" smtClean="0"/>
-              <a:t>17/03/2016</a:t>
+              <a:t>20/03/2016</a:t>
             </a:fld>
             <a:endParaRPr lang="es-ES"/>
           </a:p>
@@ -470,7 +471,7 @@
           <a:p>
             <a:fld id="{D2DCFC82-683F-4A30-9D41-F91D66C01B0C}" type="datetimeFigureOut">
               <a:rPr lang="es-ES" smtClean="0"/>
-              <a:t>17/03/2016</a:t>
+              <a:t>20/03/2016</a:t>
             </a:fld>
             <a:endParaRPr lang="es-ES"/>
           </a:p>
@@ -650,7 +651,7 @@
           <a:p>
             <a:fld id="{D2DCFC82-683F-4A30-9D41-F91D66C01B0C}" type="datetimeFigureOut">
               <a:rPr lang="es-ES" smtClean="0"/>
-              <a:t>17/03/2016</a:t>
+              <a:t>20/03/2016</a:t>
             </a:fld>
             <a:endParaRPr lang="es-ES"/>
           </a:p>
@@ -820,7 +821,7 @@
           <a:p>
             <a:fld id="{D2DCFC82-683F-4A30-9D41-F91D66C01B0C}" type="datetimeFigureOut">
               <a:rPr lang="es-ES" smtClean="0"/>
-              <a:t>17/03/2016</a:t>
+              <a:t>20/03/2016</a:t>
             </a:fld>
             <a:endParaRPr lang="es-ES"/>
           </a:p>
@@ -1066,7 +1067,7 @@
           <a:p>
             <a:fld id="{D2DCFC82-683F-4A30-9D41-F91D66C01B0C}" type="datetimeFigureOut">
               <a:rPr lang="es-ES" smtClean="0"/>
-              <a:t>17/03/2016</a:t>
+              <a:t>20/03/2016</a:t>
             </a:fld>
             <a:endParaRPr lang="es-ES"/>
           </a:p>
@@ -1354,7 +1355,7 @@
           <a:p>
             <a:fld id="{D2DCFC82-683F-4A30-9D41-F91D66C01B0C}" type="datetimeFigureOut">
               <a:rPr lang="es-ES" smtClean="0"/>
-              <a:t>17/03/2016</a:t>
+              <a:t>20/03/2016</a:t>
             </a:fld>
             <a:endParaRPr lang="es-ES"/>
           </a:p>
@@ -1776,7 +1777,7 @@
           <a:p>
             <a:fld id="{D2DCFC82-683F-4A30-9D41-F91D66C01B0C}" type="datetimeFigureOut">
               <a:rPr lang="es-ES" smtClean="0"/>
-              <a:t>17/03/2016</a:t>
+              <a:t>20/03/2016</a:t>
             </a:fld>
             <a:endParaRPr lang="es-ES"/>
           </a:p>
@@ -1894,7 +1895,7 @@
           <a:p>
             <a:fld id="{D2DCFC82-683F-4A30-9D41-F91D66C01B0C}" type="datetimeFigureOut">
               <a:rPr lang="es-ES" smtClean="0"/>
-              <a:t>17/03/2016</a:t>
+              <a:t>20/03/2016</a:t>
             </a:fld>
             <a:endParaRPr lang="es-ES"/>
           </a:p>
@@ -1989,7 +1990,7 @@
           <a:p>
             <a:fld id="{D2DCFC82-683F-4A30-9D41-F91D66C01B0C}" type="datetimeFigureOut">
               <a:rPr lang="es-ES" smtClean="0"/>
-              <a:t>17/03/2016</a:t>
+              <a:t>20/03/2016</a:t>
             </a:fld>
             <a:endParaRPr lang="es-ES"/>
           </a:p>
@@ -2266,7 +2267,7 @@
           <a:p>
             <a:fld id="{D2DCFC82-683F-4A30-9D41-F91D66C01B0C}" type="datetimeFigureOut">
               <a:rPr lang="es-ES" smtClean="0"/>
-              <a:t>17/03/2016</a:t>
+              <a:t>20/03/2016</a:t>
             </a:fld>
             <a:endParaRPr lang="es-ES"/>
           </a:p>
@@ -2519,7 +2520,7 @@
           <a:p>
             <a:fld id="{D2DCFC82-683F-4A30-9D41-F91D66C01B0C}" type="datetimeFigureOut">
               <a:rPr lang="es-ES" smtClean="0"/>
-              <a:t>17/03/2016</a:t>
+              <a:t>20/03/2016</a:t>
             </a:fld>
             <a:endParaRPr lang="es-ES"/>
           </a:p>
@@ -2732,7 +2733,7 @@
           <a:p>
             <a:fld id="{D2DCFC82-683F-4A30-9D41-F91D66C01B0C}" type="datetimeFigureOut">
               <a:rPr lang="es-ES" smtClean="0"/>
-              <a:t>17/03/2016</a:t>
+              <a:t>20/03/2016</a:t>
             </a:fld>
             <a:endParaRPr lang="es-ES"/>
           </a:p>
@@ -3288,7 +3289,7 @@
         </p:nvSpPr>
         <p:spPr>
           <a:xfrm>
-            <a:off x="35496" y="3501008"/>
+            <a:off x="65585" y="3068960"/>
             <a:ext cx="7962799" cy="2088232"/>
           </a:xfrm>
         </p:spPr>
@@ -3356,15 +3357,15 @@
         </p:nvSpPr>
         <p:spPr>
           <a:xfrm>
-            <a:off x="2016224" y="1497558"/>
-            <a:ext cx="4572000" cy="923330"/>
+            <a:off x="611560" y="1497558"/>
+            <a:ext cx="7200800" cy="507831"/>
           </a:xfrm>
           <a:prstGeom prst="rect">
             <a:avLst/>
           </a:prstGeom>
         </p:spPr>
         <p:txBody>
-          <a:bodyPr>
+          <a:bodyPr wrap="square">
             <a:spAutoFit/>
           </a:bodyPr>
           <a:lstStyle/>
@@ -3372,14 +3373,23 @@
             <a:pPr algn="ctr"/>
             <a:r>
               <a:rPr lang="es-AR" sz="2700" u="sng" dirty="0"/>
-              <a:t>Conector RS232 (Balanza)</a:t>
-            </a:r>
-          </a:p>
-          <a:p>
-            <a:pPr algn="ctr"/>
+              <a:t>Conector RS232 (Balanza</a:t>
+            </a:r>
+            <a:r>
+              <a:rPr lang="es-AR" sz="2700" u="sng" dirty="0" smtClean="0"/>
+              <a:t>) e </a:t>
+            </a:r>
             <a:r>
               <a:rPr lang="es-AR" sz="2700" u="sng" dirty="0"/>
-              <a:t>Interacción obreros</a:t>
+              <a:t>i</a:t>
+            </a:r>
+            <a:r>
+              <a:rPr lang="es-AR" sz="2700" u="sng" dirty="0" smtClean="0"/>
+              <a:t>nteracción </a:t>
+            </a:r>
+            <a:r>
+              <a:rPr lang="es-AR" sz="2700" u="sng" dirty="0"/>
+              <a:t>obreros</a:t>
             </a:r>
           </a:p>
         </p:txBody>
@@ -3471,22 +3481,14 @@
           <a:p>
             <a:r>
               <a:rPr lang="es-AR" dirty="0" smtClean="0"/>
-              <a:t>Mejoras en la </a:t>
-            </a:r>
+              <a:t>Mejoras en la empresa</a:t>
+            </a:r>
+            <a:endParaRPr lang="es-AR" dirty="0"/>
+          </a:p>
+          <a:p>
             <a:r>
               <a:rPr lang="es-AR" dirty="0" smtClean="0"/>
-              <a:t>empresa</a:t>
-            </a:r>
-            <a:endParaRPr lang="es-AR" dirty="0"/>
-          </a:p>
-          <a:p>
-            <a:r>
-              <a:rPr lang="es-AR" dirty="0" smtClean="0"/>
-              <a:t>Disminución errores </a:t>
-            </a:r>
-            <a:r>
-              <a:rPr lang="es-AR" dirty="0" smtClean="0"/>
-              <a:t>empleados</a:t>
+              <a:t>Disminución errores empleados</a:t>
             </a:r>
             <a:endParaRPr lang="es-AR" dirty="0"/>
           </a:p>
@@ -3619,7 +3621,7 @@
         <p:spPr>
           <a:xfrm>
             <a:off x="-6423" y="2143397"/>
-            <a:ext cx="7962799" cy="2005683"/>
+            <a:ext cx="4146375" cy="997571"/>
           </a:xfrm>
         </p:spPr>
         <p:txBody>
@@ -3638,12 +3640,6 @@
           </a:p>
           <a:p>
             <a:endParaRPr lang="es-AR" dirty="0" smtClean="0"/>
-          </a:p>
-          <a:p>
-            <a:r>
-              <a:rPr lang="es-AR" dirty="0" smtClean="0"/>
-              <a:t>Tecnologías utilizadas</a:t>
-            </a:r>
           </a:p>
           <a:p>
             <a:endParaRPr lang="es-ES" dirty="0"/>
@@ -3674,6 +3670,36 @@
           <a:xfrm>
             <a:off x="8419999" y="0"/>
             <a:ext cx="724001" cy="6858000"/>
+          </a:xfrm>
+          <a:prstGeom prst="rect">
+            <a:avLst/>
+          </a:prstGeom>
+        </p:spPr>
+      </p:pic>
+      <p:pic>
+        <p:nvPicPr>
+          <p:cNvPr id="7" name="Picture 6"/>
+          <p:cNvPicPr>
+            <a:picLocks noChangeAspect="1"/>
+          </p:cNvPicPr>
+          <p:nvPr/>
+        </p:nvPicPr>
+        <p:blipFill>
+          <a:blip r:embed="rId3">
+            <a:extLst>
+              <a:ext uri="{28A0092B-C50C-407E-A947-70E740481C1C}">
+                <a14:useLocalDpi xmlns:a14="http://schemas.microsoft.com/office/drawing/2010/main" val="0"/>
+              </a:ext>
+            </a:extLst>
+          </a:blip>
+          <a:stretch>
+            <a:fillRect/>
+          </a:stretch>
+        </p:blipFill>
+        <p:spPr>
+          <a:xfrm>
+            <a:off x="2741898" y="2983979"/>
+            <a:ext cx="2952328" cy="2952328"/>
           </a:xfrm>
           <a:prstGeom prst="rect">
             <a:avLst/>
@@ -3739,6 +3765,343 @@
           <a:p>
             <a:r>
               <a:rPr lang="es-AR" dirty="0" smtClean="0"/>
+              <a:t>Conclusiones</a:t>
+            </a:r>
+            <a:endParaRPr lang="es-ES" dirty="0"/>
+          </a:p>
+        </p:txBody>
+      </p:sp>
+      <p:pic>
+        <p:nvPicPr>
+          <p:cNvPr id="4" name="Picture 3"/>
+          <p:cNvPicPr>
+            <a:picLocks noChangeAspect="1"/>
+          </p:cNvPicPr>
+          <p:nvPr/>
+        </p:nvPicPr>
+        <p:blipFill>
+          <a:blip r:embed="rId2">
+            <a:extLst>
+              <a:ext uri="{28A0092B-C50C-407E-A947-70E740481C1C}">
+                <a14:useLocalDpi xmlns:a14="http://schemas.microsoft.com/office/drawing/2010/main" val="0"/>
+              </a:ext>
+            </a:extLst>
+          </a:blip>
+          <a:stretch>
+            <a:fillRect/>
+          </a:stretch>
+        </p:blipFill>
+        <p:spPr>
+          <a:xfrm>
+            <a:off x="8419999" y="0"/>
+            <a:ext cx="724001" cy="6858000"/>
+          </a:xfrm>
+          <a:prstGeom prst="rect">
+            <a:avLst/>
+          </a:prstGeom>
+        </p:spPr>
+      </p:pic>
+      <p:sp>
+        <p:nvSpPr>
+          <p:cNvPr id="5" name="Rectangle 4"/>
+          <p:cNvSpPr/>
+          <p:nvPr/>
+        </p:nvSpPr>
+        <p:spPr>
+          <a:xfrm>
+            <a:off x="179512" y="1988840"/>
+            <a:ext cx="5184576" cy="584775"/>
+          </a:xfrm>
+          <a:prstGeom prst="rect">
+            <a:avLst/>
+          </a:prstGeom>
+        </p:spPr>
+        <p:txBody>
+          <a:bodyPr wrap="square">
+            <a:spAutoFit/>
+          </a:bodyPr>
+          <a:lstStyle/>
+          <a:p>
+            <a:pPr marL="457200" indent="-457200">
+              <a:buFont typeface="Arial" panose="020B0604020202020204" pitchFamily="34" charset="0"/>
+              <a:buChar char="•"/>
+            </a:pPr>
+            <a:r>
+              <a:rPr lang="es-AR" sz="3200" dirty="0"/>
+              <a:t>Tecnologías utilizadas</a:t>
+            </a:r>
+          </a:p>
+        </p:txBody>
+      </p:sp>
+      <p:pic>
+        <p:nvPicPr>
+          <p:cNvPr id="6" name="Picture 5"/>
+          <p:cNvPicPr>
+            <a:picLocks noChangeAspect="1"/>
+          </p:cNvPicPr>
+          <p:nvPr/>
+        </p:nvPicPr>
+        <p:blipFill>
+          <a:blip r:embed="rId3">
+            <a:extLst>
+              <a:ext uri="{28A0092B-C50C-407E-A947-70E740481C1C}">
+                <a14:useLocalDpi xmlns:a14="http://schemas.microsoft.com/office/drawing/2010/main" val="0"/>
+              </a:ext>
+            </a:extLst>
+          </a:blip>
+          <a:stretch>
+            <a:fillRect/>
+          </a:stretch>
+        </p:blipFill>
+        <p:spPr>
+          <a:xfrm>
+            <a:off x="833339" y="2771403"/>
+            <a:ext cx="1315194" cy="1315194"/>
+          </a:xfrm>
+          <a:prstGeom prst="rect">
+            <a:avLst/>
+          </a:prstGeom>
+        </p:spPr>
+      </p:pic>
+      <p:pic>
+        <p:nvPicPr>
+          <p:cNvPr id="9" name="Picture 8"/>
+          <p:cNvPicPr>
+            <a:picLocks noChangeAspect="1"/>
+          </p:cNvPicPr>
+          <p:nvPr/>
+        </p:nvPicPr>
+        <p:blipFill>
+          <a:blip r:embed="rId4">
+            <a:extLst>
+              <a:ext uri="{28A0092B-C50C-407E-A947-70E740481C1C}">
+                <a14:useLocalDpi xmlns:a14="http://schemas.microsoft.com/office/drawing/2010/main" val="0"/>
+              </a:ext>
+            </a:extLst>
+          </a:blip>
+          <a:stretch>
+            <a:fillRect/>
+          </a:stretch>
+        </p:blipFill>
+        <p:spPr>
+          <a:xfrm>
+            <a:off x="3059832" y="3113137"/>
+            <a:ext cx="2232248" cy="819919"/>
+          </a:xfrm>
+          <a:prstGeom prst="rect">
+            <a:avLst/>
+          </a:prstGeom>
+        </p:spPr>
+      </p:pic>
+      <p:pic>
+        <p:nvPicPr>
+          <p:cNvPr id="11" name="Picture 10"/>
+          <p:cNvPicPr>
+            <a:picLocks noChangeAspect="1"/>
+          </p:cNvPicPr>
+          <p:nvPr/>
+        </p:nvPicPr>
+        <p:blipFill>
+          <a:blip r:embed="rId5">
+            <a:extLst>
+              <a:ext uri="{28A0092B-C50C-407E-A947-70E740481C1C}">
+                <a14:useLocalDpi xmlns:a14="http://schemas.microsoft.com/office/drawing/2010/main" val="0"/>
+              </a:ext>
+            </a:extLst>
+          </a:blip>
+          <a:stretch>
+            <a:fillRect/>
+          </a:stretch>
+        </p:blipFill>
+        <p:spPr>
+          <a:xfrm>
+            <a:off x="866676" y="4581128"/>
+            <a:ext cx="1248520" cy="1248520"/>
+          </a:xfrm>
+          <a:prstGeom prst="rect">
+            <a:avLst/>
+          </a:prstGeom>
+        </p:spPr>
+      </p:pic>
+      <p:pic>
+        <p:nvPicPr>
+          <p:cNvPr id="12" name="Picture 11"/>
+          <p:cNvPicPr>
+            <a:picLocks noChangeAspect="1"/>
+          </p:cNvPicPr>
+          <p:nvPr/>
+        </p:nvPicPr>
+        <p:blipFill>
+          <a:blip r:embed="rId6">
+            <a:extLst>
+              <a:ext uri="{28A0092B-C50C-407E-A947-70E740481C1C}">
+                <a14:useLocalDpi xmlns:a14="http://schemas.microsoft.com/office/drawing/2010/main" val="0"/>
+              </a:ext>
+            </a:extLst>
+          </a:blip>
+          <a:stretch>
+            <a:fillRect/>
+          </a:stretch>
+        </p:blipFill>
+        <p:spPr>
+          <a:xfrm>
+            <a:off x="2696716" y="4627786"/>
+            <a:ext cx="1155204" cy="1155204"/>
+          </a:xfrm>
+          <a:prstGeom prst="rect">
+            <a:avLst/>
+          </a:prstGeom>
+        </p:spPr>
+      </p:pic>
+      <p:pic>
+        <p:nvPicPr>
+          <p:cNvPr id="13" name="Picture 12"/>
+          <p:cNvPicPr>
+            <a:picLocks noChangeAspect="1"/>
+          </p:cNvPicPr>
+          <p:nvPr/>
+        </p:nvPicPr>
+        <p:blipFill>
+          <a:blip r:embed="rId7">
+            <a:extLst>
+              <a:ext uri="{28A0092B-C50C-407E-A947-70E740481C1C}">
+                <a14:useLocalDpi xmlns:a14="http://schemas.microsoft.com/office/drawing/2010/main" val="0"/>
+              </a:ext>
+            </a:extLst>
+          </a:blip>
+          <a:stretch>
+            <a:fillRect/>
+          </a:stretch>
+        </p:blipFill>
+        <p:spPr>
+          <a:xfrm>
+            <a:off x="4499992" y="4800319"/>
+            <a:ext cx="1475606" cy="810137"/>
+          </a:xfrm>
+          <a:prstGeom prst="rect">
+            <a:avLst/>
+          </a:prstGeom>
+        </p:spPr>
+      </p:pic>
+      <p:pic>
+        <p:nvPicPr>
+          <p:cNvPr id="3" name="Picture 2"/>
+          <p:cNvPicPr>
+            <a:picLocks noChangeAspect="1"/>
+          </p:cNvPicPr>
+          <p:nvPr/>
+        </p:nvPicPr>
+        <p:blipFill>
+          <a:blip r:embed="rId8">
+            <a:extLst>
+              <a:ext uri="{28A0092B-C50C-407E-A947-70E740481C1C}">
+                <a14:useLocalDpi xmlns:a14="http://schemas.microsoft.com/office/drawing/2010/main" val="0"/>
+              </a:ext>
+            </a:extLst>
+          </a:blip>
+          <a:stretch>
+            <a:fillRect/>
+          </a:stretch>
+        </p:blipFill>
+        <p:spPr>
+          <a:xfrm>
+            <a:off x="5670586" y="2824607"/>
+            <a:ext cx="2241477" cy="1396977"/>
+          </a:xfrm>
+          <a:prstGeom prst="rect">
+            <a:avLst/>
+          </a:prstGeom>
+        </p:spPr>
+      </p:pic>
+      <p:pic>
+        <p:nvPicPr>
+          <p:cNvPr id="7" name="Picture 6"/>
+          <p:cNvPicPr>
+            <a:picLocks noChangeAspect="1"/>
+          </p:cNvPicPr>
+          <p:nvPr/>
+        </p:nvPicPr>
+        <p:blipFill>
+          <a:blip r:embed="rId9">
+            <a:extLst>
+              <a:ext uri="{28A0092B-C50C-407E-A947-70E740481C1C}">
+                <a14:useLocalDpi xmlns:a14="http://schemas.microsoft.com/office/drawing/2010/main" val="0"/>
+              </a:ext>
+            </a:extLst>
+          </a:blip>
+          <a:stretch>
+            <a:fillRect/>
+          </a:stretch>
+        </p:blipFill>
+        <p:spPr>
+          <a:xfrm>
+            <a:off x="6494177" y="4496445"/>
+            <a:ext cx="1417886" cy="1417886"/>
+          </a:xfrm>
+          <a:prstGeom prst="rect">
+            <a:avLst/>
+          </a:prstGeom>
+        </p:spPr>
+      </p:pic>
+    </p:spTree>
+    <p:extLst>
+      <p:ext uri="{BB962C8B-B14F-4D97-AF65-F5344CB8AC3E}">
+        <p14:creationId xmlns:p14="http://schemas.microsoft.com/office/powerpoint/2010/main" val="1154458367"/>
+      </p:ext>
+    </p:extLst>
+  </p:cSld>
+  <p:clrMapOvr>
+    <a:masterClrMapping/>
+  </p:clrMapOvr>
+  <p:timing>
+    <p:tnLst>
+      <p:par>
+        <p:cTn id="1" dur="indefinite" restart="never" nodeType="tmRoot"/>
+      </p:par>
+    </p:tnLst>
+  </p:timing>
+</p:sld>
+</file>
+
+<file path=ppt/slides/slide14.xml><?xml version="1.0" encoding="utf-8"?>
+<p:sld xmlns:a="http://schemas.openxmlformats.org/drawingml/2006/main" xmlns:r="http://schemas.openxmlformats.org/officeDocument/2006/relationships" xmlns:p="http://schemas.openxmlformats.org/presentationml/2006/main">
+  <p:cSld>
+    <p:spTree>
+      <p:nvGrpSpPr>
+        <p:cNvPr id="1" name=""/>
+        <p:cNvGrpSpPr/>
+        <p:nvPr/>
+      </p:nvGrpSpPr>
+      <p:grpSpPr>
+        <a:xfrm>
+          <a:off x="0" y="0"/>
+          <a:ext cx="0" cy="0"/>
+          <a:chOff x="0" y="0"/>
+          <a:chExt cx="0" cy="0"/>
+        </a:xfrm>
+      </p:grpSpPr>
+      <p:sp>
+        <p:nvSpPr>
+          <p:cNvPr id="2" name="Title 1"/>
+          <p:cNvSpPr>
+            <a:spLocks noGrp="1"/>
+          </p:cNvSpPr>
+          <p:nvPr>
+            <p:ph type="title"/>
+          </p:nvPr>
+        </p:nvSpPr>
+        <p:spPr>
+          <a:xfrm>
+            <a:off x="179512" y="-27384"/>
+            <a:ext cx="8229600" cy="1143000"/>
+          </a:xfrm>
+        </p:spPr>
+        <p:txBody>
+          <a:bodyPr/>
+          <a:lstStyle/>
+          <a:p>
+            <a:r>
+              <a:rPr lang="es-AR" dirty="0" smtClean="0"/>
               <a:t>Preguntas</a:t>
             </a:r>
             <a:endParaRPr lang="es-ES" dirty="0"/>
@@ -5292,11 +5655,7 @@
           <a:p>
             <a:r>
               <a:rPr lang="es-AR" dirty="0" smtClean="0"/>
-              <a:t>Toma de </a:t>
-            </a:r>
-            <a:r>
-              <a:rPr lang="es-AR" dirty="0" smtClean="0"/>
-              <a:t>datos</a:t>
+              <a:t>Toma de datos</a:t>
             </a:r>
           </a:p>
           <a:p>
@@ -5304,7 +5663,6 @@
               <a:rPr lang="es-AR" dirty="0" smtClean="0"/>
               <a:t>Ambientales</a:t>
             </a:r>
-            <a:endParaRPr lang="es-AR" dirty="0" smtClean="0"/>
           </a:p>
           <a:p>
             <a:r>
@@ -5315,20 +5673,14 @@
           <a:p>
             <a:r>
               <a:rPr lang="es-AR" dirty="0" smtClean="0"/>
-              <a:t>Conector </a:t>
-            </a:r>
-            <a:r>
-              <a:rPr lang="es-AR" dirty="0" smtClean="0"/>
-              <a:t>RS232 (Balanza)</a:t>
-            </a:r>
-            <a:endParaRPr lang="es-AR" dirty="0" smtClean="0"/>
+              <a:t>Conector RS232 (Balanza)</a:t>
+            </a:r>
           </a:p>
           <a:p>
             <a:r>
               <a:rPr lang="es-AR" dirty="0" smtClean="0"/>
               <a:t>Interacción obreros</a:t>
             </a:r>
-            <a:endParaRPr lang="es-AR" dirty="0" smtClean="0"/>
           </a:p>
           <a:p>
             <a:endParaRPr lang="es-ES" dirty="0"/>
@@ -5457,11 +5809,7 @@
           <a:p>
             <a:r>
               <a:rPr lang="es-AR" dirty="0" smtClean="0"/>
-              <a:t>Hacer </a:t>
-            </a:r>
-            <a:r>
-              <a:rPr lang="es-AR" dirty="0" smtClean="0"/>
-              <a:t>muchas preguntas =&gt; diagramas</a:t>
+              <a:t>Hacer muchas preguntas =&gt; diagramas</a:t>
             </a:r>
           </a:p>
           <a:p>
@@ -5658,15 +6006,7 @@
           <a:p>
             <a:r>
               <a:rPr lang="es-AR" dirty="0" smtClean="0"/>
-              <a:t>Propuesta </a:t>
-            </a:r>
-            <a:r>
-              <a:rPr lang="es-AR" dirty="0" smtClean="0"/>
-              <a:t>código de barra =&gt; código </a:t>
-            </a:r>
-            <a:r>
-              <a:rPr lang="es-AR" dirty="0" smtClean="0"/>
-              <a:t>QR</a:t>
+              <a:t>Propuesta código de barra =&gt; código QR</a:t>
             </a:r>
           </a:p>
           <a:p>
@@ -5754,15 +6094,15 @@
         </p:nvSpPr>
         <p:spPr>
           <a:xfrm>
-            <a:off x="2195736" y="1497558"/>
-            <a:ext cx="4572000" cy="923330"/>
+            <a:off x="1043608" y="1497558"/>
+            <a:ext cx="6840760" cy="507831"/>
           </a:xfrm>
           <a:prstGeom prst="rect">
             <a:avLst/>
           </a:prstGeom>
         </p:spPr>
         <p:txBody>
-          <a:bodyPr>
+          <a:bodyPr wrap="square">
             <a:spAutoFit/>
           </a:bodyPr>
           <a:lstStyle/>
@@ -5770,15 +6110,13 @@
             <a:pPr algn="ctr"/>
             <a:r>
               <a:rPr lang="es-AR" sz="2700" u="sng" dirty="0"/>
-              <a:t>Toma de datos</a:t>
-            </a:r>
-          </a:p>
-          <a:p>
-            <a:pPr algn="ctr"/>
-            <a:r>
-              <a:rPr lang="es-AR" sz="2700" u="sng" dirty="0"/>
-              <a:t>Ambientales</a:t>
-            </a:r>
+              <a:t>Toma de </a:t>
+            </a:r>
+            <a:r>
+              <a:rPr lang="es-AR" sz="2700" u="sng" dirty="0" smtClean="0"/>
+              <a:t>datos y Ambientales</a:t>
+            </a:r>
+            <a:endParaRPr lang="es-AR" sz="2700" u="sng" dirty="0"/>
           </a:p>
         </p:txBody>
       </p:sp>

</xml_diff>

<commit_message>
Subo tablas base de datos en formato .sql
</commit_message>
<xml_diff>
--- a/Presentacion/Presentacion Final.pptx
+++ b/Presentacion/Presentacion Final.pptx
@@ -10,15 +10,16 @@
     <p:sldId id="263" r:id="rId4"/>
     <p:sldId id="262" r:id="rId5"/>
     <p:sldId id="268" r:id="rId6"/>
-    <p:sldId id="259" r:id="rId7"/>
-    <p:sldId id="261" r:id="rId8"/>
-    <p:sldId id="265" r:id="rId9"/>
-    <p:sldId id="266" r:id="rId10"/>
-    <p:sldId id="264" r:id="rId11"/>
-    <p:sldId id="257" r:id="rId12"/>
-    <p:sldId id="258" r:id="rId13"/>
-    <p:sldId id="269" r:id="rId14"/>
-    <p:sldId id="267" r:id="rId15"/>
+    <p:sldId id="270" r:id="rId7"/>
+    <p:sldId id="259" r:id="rId8"/>
+    <p:sldId id="261" r:id="rId9"/>
+    <p:sldId id="265" r:id="rId10"/>
+    <p:sldId id="266" r:id="rId11"/>
+    <p:sldId id="264" r:id="rId12"/>
+    <p:sldId id="257" r:id="rId13"/>
+    <p:sldId id="258" r:id="rId14"/>
+    <p:sldId id="269" r:id="rId15"/>
+    <p:sldId id="267" r:id="rId16"/>
   </p:sldIdLst>
   <p:sldSz cx="9144000" cy="6858000" type="screen4x3"/>
   <p:notesSz cx="6858000" cy="9144000"/>
@@ -301,7 +302,7 @@
           <a:p>
             <a:fld id="{D2DCFC82-683F-4A30-9D41-F91D66C01B0C}" type="datetimeFigureOut">
               <a:rPr lang="es-ES" smtClean="0"/>
-              <a:t>03/04/2016</a:t>
+              <a:t>10/04/2016</a:t>
             </a:fld>
             <a:endParaRPr lang="es-ES"/>
           </a:p>
@@ -471,7 +472,7 @@
           <a:p>
             <a:fld id="{D2DCFC82-683F-4A30-9D41-F91D66C01B0C}" type="datetimeFigureOut">
               <a:rPr lang="es-ES" smtClean="0"/>
-              <a:t>03/04/2016</a:t>
+              <a:t>10/04/2016</a:t>
             </a:fld>
             <a:endParaRPr lang="es-ES"/>
           </a:p>
@@ -651,7 +652,7 @@
           <a:p>
             <a:fld id="{D2DCFC82-683F-4A30-9D41-F91D66C01B0C}" type="datetimeFigureOut">
               <a:rPr lang="es-ES" smtClean="0"/>
-              <a:t>03/04/2016</a:t>
+              <a:t>10/04/2016</a:t>
             </a:fld>
             <a:endParaRPr lang="es-ES"/>
           </a:p>
@@ -821,7 +822,7 @@
           <a:p>
             <a:fld id="{D2DCFC82-683F-4A30-9D41-F91D66C01B0C}" type="datetimeFigureOut">
               <a:rPr lang="es-ES" smtClean="0"/>
-              <a:t>03/04/2016</a:t>
+              <a:t>10/04/2016</a:t>
             </a:fld>
             <a:endParaRPr lang="es-ES"/>
           </a:p>
@@ -1067,7 +1068,7 @@
           <a:p>
             <a:fld id="{D2DCFC82-683F-4A30-9D41-F91D66C01B0C}" type="datetimeFigureOut">
               <a:rPr lang="es-ES" smtClean="0"/>
-              <a:t>03/04/2016</a:t>
+              <a:t>10/04/2016</a:t>
             </a:fld>
             <a:endParaRPr lang="es-ES"/>
           </a:p>
@@ -1355,7 +1356,7 @@
           <a:p>
             <a:fld id="{D2DCFC82-683F-4A30-9D41-F91D66C01B0C}" type="datetimeFigureOut">
               <a:rPr lang="es-ES" smtClean="0"/>
-              <a:t>03/04/2016</a:t>
+              <a:t>10/04/2016</a:t>
             </a:fld>
             <a:endParaRPr lang="es-ES"/>
           </a:p>
@@ -1777,7 +1778,7 @@
           <a:p>
             <a:fld id="{D2DCFC82-683F-4A30-9D41-F91D66C01B0C}" type="datetimeFigureOut">
               <a:rPr lang="es-ES" smtClean="0"/>
-              <a:t>03/04/2016</a:t>
+              <a:t>10/04/2016</a:t>
             </a:fld>
             <a:endParaRPr lang="es-ES"/>
           </a:p>
@@ -1895,7 +1896,7 @@
           <a:p>
             <a:fld id="{D2DCFC82-683F-4A30-9D41-F91D66C01B0C}" type="datetimeFigureOut">
               <a:rPr lang="es-ES" smtClean="0"/>
-              <a:t>03/04/2016</a:t>
+              <a:t>10/04/2016</a:t>
             </a:fld>
             <a:endParaRPr lang="es-ES"/>
           </a:p>
@@ -1990,7 +1991,7 @@
           <a:p>
             <a:fld id="{D2DCFC82-683F-4A30-9D41-F91D66C01B0C}" type="datetimeFigureOut">
               <a:rPr lang="es-ES" smtClean="0"/>
-              <a:t>03/04/2016</a:t>
+              <a:t>10/04/2016</a:t>
             </a:fld>
             <a:endParaRPr lang="es-ES"/>
           </a:p>
@@ -2267,7 +2268,7 @@
           <a:p>
             <a:fld id="{D2DCFC82-683F-4A30-9D41-F91D66C01B0C}" type="datetimeFigureOut">
               <a:rPr lang="es-ES" smtClean="0"/>
-              <a:t>03/04/2016</a:t>
+              <a:t>10/04/2016</a:t>
             </a:fld>
             <a:endParaRPr lang="es-ES"/>
           </a:p>
@@ -2520,7 +2521,7 @@
           <a:p>
             <a:fld id="{D2DCFC82-683F-4A30-9D41-F91D66C01B0C}" type="datetimeFigureOut">
               <a:rPr lang="es-ES" smtClean="0"/>
-              <a:t>03/04/2016</a:t>
+              <a:t>10/04/2016</a:t>
             </a:fld>
             <a:endParaRPr lang="es-ES"/>
           </a:p>
@@ -2733,7 +2734,7 @@
           <a:p>
             <a:fld id="{D2DCFC82-683F-4A30-9D41-F91D66C01B0C}" type="datetimeFigureOut">
               <a:rPr lang="es-ES" smtClean="0"/>
-              <a:t>03/04/2016</a:t>
+              <a:t>10/04/2016</a:t>
             </a:fld>
             <a:endParaRPr lang="es-ES"/>
           </a:p>
@@ -3271,7 +3272,7 @@
           <a:p>
             <a:r>
               <a:rPr lang="es-AR" dirty="0" smtClean="0"/>
-              <a:t>Soluciones </a:t>
+              <a:t>Soluciones</a:t>
             </a:r>
             <a:endParaRPr lang="es-ES" dirty="0"/>
           </a:p>
@@ -3289,8 +3290,8 @@
         </p:nvSpPr>
         <p:spPr>
           <a:xfrm>
-            <a:off x="65585" y="3068960"/>
-            <a:ext cx="7962799" cy="2088232"/>
+            <a:off x="35496" y="2564904"/>
+            <a:ext cx="7962799" cy="1440160"/>
           </a:xfrm>
         </p:spPr>
         <p:txBody>
@@ -3298,21 +3299,12 @@
           <a:lstStyle/>
           <a:p>
             <a:r>
-              <a:rPr lang="es-AR" dirty="0" smtClean="0"/>
-              <a:t>Consulta de experto</a:t>
-            </a:r>
-          </a:p>
-          <a:p>
-            <a:pPr marL="0" indent="0">
-              <a:buNone/>
-            </a:pPr>
+              <a:rPr lang="es-AR" dirty="0"/>
+              <a:t>Ir preparado a cada reunión</a:t>
+            </a:r>
+          </a:p>
+          <a:p>
             <a:endParaRPr lang="es-AR" dirty="0" smtClean="0"/>
-          </a:p>
-          <a:p>
-            <a:r>
-              <a:rPr lang="es-AR" dirty="0" smtClean="0"/>
-              <a:t>Amoldar a las diferentes situaciones</a:t>
-            </a:r>
           </a:p>
           <a:p>
             <a:endParaRPr lang="es-ES" dirty="0"/>
@@ -3349,47 +3341,60 @@
           </a:prstGeom>
         </p:spPr>
       </p:pic>
-      <p:sp>
-        <p:nvSpPr>
-          <p:cNvPr id="5" name="Rectangle 4"/>
-          <p:cNvSpPr/>
+      <p:pic>
+        <p:nvPicPr>
+          <p:cNvPr id="5" name="Picture 4"/>
+          <p:cNvPicPr>
+            <a:picLocks noChangeAspect="1"/>
+          </p:cNvPicPr>
           <p:nvPr/>
-        </p:nvSpPr>
-        <p:spPr>
-          <a:xfrm>
-            <a:off x="611560" y="1497558"/>
-            <a:ext cx="7200800" cy="507831"/>
+        </p:nvPicPr>
+        <p:blipFill>
+          <a:blip r:embed="rId3">
+            <a:extLst>
+              <a:ext uri="{28A0092B-C50C-407E-A947-70E740481C1C}">
+                <a14:useLocalDpi xmlns:a14="http://schemas.microsoft.com/office/drawing/2010/main" val="0"/>
+              </a:ext>
+            </a:extLst>
+          </a:blip>
+          <a:stretch>
+            <a:fillRect/>
+          </a:stretch>
+        </p:blipFill>
+        <p:spPr>
+          <a:xfrm>
+            <a:off x="3081766" y="3933056"/>
+            <a:ext cx="2876952" cy="2200582"/>
           </a:xfrm>
           <a:prstGeom prst="rect">
             <a:avLst/>
           </a:prstGeom>
         </p:spPr>
-        <p:txBody>
-          <a:bodyPr wrap="square">
+      </p:pic>
+      <p:sp>
+        <p:nvSpPr>
+          <p:cNvPr id="6" name="Rectangle 5"/>
+          <p:cNvSpPr/>
+          <p:nvPr/>
+        </p:nvSpPr>
+        <p:spPr>
+          <a:xfrm>
+            <a:off x="3131840" y="1628800"/>
+            <a:ext cx="2482346" cy="507831"/>
+          </a:xfrm>
+          <a:prstGeom prst="rect">
+            <a:avLst/>
+          </a:prstGeom>
+        </p:spPr>
+        <p:txBody>
+          <a:bodyPr wrap="none">
             <a:spAutoFit/>
           </a:bodyPr>
           <a:lstStyle/>
           <a:p>
-            <a:pPr algn="ctr"/>
             <a:r>
               <a:rPr lang="es-AR" sz="2700" u="sng" dirty="0"/>
-              <a:t>Conector RS232 (Balanza</a:t>
-            </a:r>
-            <a:r>
-              <a:rPr lang="es-AR" sz="2700" u="sng" dirty="0" smtClean="0"/>
-              <a:t>) e </a:t>
-            </a:r>
-            <a:r>
-              <a:rPr lang="es-AR" sz="2700" u="sng" dirty="0"/>
-              <a:t>i</a:t>
-            </a:r>
-            <a:r>
-              <a:rPr lang="es-AR" sz="2700" u="sng" dirty="0" smtClean="0"/>
-              <a:t>nteracción </a:t>
-            </a:r>
-            <a:r>
-              <a:rPr lang="es-AR" sz="2700" u="sng" dirty="0"/>
-              <a:t>obreros</a:t>
+              <a:t>Tiempo limitado</a:t>
             </a:r>
           </a:p>
         </p:txBody>
@@ -3397,7 +3402,7 @@
     </p:spTree>
     <p:extLst>
       <p:ext uri="{BB962C8B-B14F-4D97-AF65-F5344CB8AC3E}">
-        <p14:creationId xmlns:p14="http://schemas.microsoft.com/office/powerpoint/2010/main" val="4012911170"/>
+        <p14:creationId xmlns:p14="http://schemas.microsoft.com/office/powerpoint/2010/main" val="2649866490"/>
       </p:ext>
     </p:extLst>
   </p:cSld>
@@ -3453,7 +3458,7 @@
           <a:p>
             <a:r>
               <a:rPr lang="es-AR" dirty="0" smtClean="0"/>
-              <a:t>Experiencia</a:t>
+              <a:t>Soluciones </a:t>
             </a:r>
             <a:endParaRPr lang="es-ES" dirty="0"/>
           </a:p>
@@ -3471,8 +3476,8 @@
         </p:nvSpPr>
         <p:spPr>
           <a:xfrm>
-            <a:off x="35496" y="2071389"/>
-            <a:ext cx="7962799" cy="3517851"/>
+            <a:off x="65585" y="3068960"/>
+            <a:ext cx="7962799" cy="2088232"/>
           </a:xfrm>
         </p:spPr>
         <p:txBody>
@@ -3481,34 +3486,22 @@
           <a:p>
             <a:r>
               <a:rPr lang="es-AR" dirty="0" smtClean="0"/>
-              <a:t>Mejoras en la empresa</a:t>
-            </a:r>
-            <a:endParaRPr lang="es-AR" dirty="0"/>
+              <a:t>Consulta de experto</a:t>
+            </a:r>
+          </a:p>
+          <a:p>
+            <a:pPr marL="0" indent="0">
+              <a:buNone/>
+            </a:pPr>
+            <a:endParaRPr lang="es-AR" dirty="0" smtClean="0"/>
           </a:p>
           <a:p>
             <a:r>
               <a:rPr lang="es-AR" dirty="0" smtClean="0"/>
-              <a:t>Disminución errores empleados</a:t>
-            </a:r>
-            <a:endParaRPr lang="es-AR" dirty="0"/>
-          </a:p>
-          <a:p>
-            <a:r>
-              <a:rPr lang="es-AR" dirty="0" smtClean="0"/>
-              <a:t>Trato con personal</a:t>
-            </a:r>
-          </a:p>
-          <a:p>
-            <a:r>
-              <a:rPr lang="es-AR" dirty="0" smtClean="0"/>
-              <a:t>Capacitación</a:t>
-            </a:r>
-          </a:p>
-          <a:p>
-            <a:r>
-              <a:rPr lang="es-AR" dirty="0" smtClean="0"/>
-              <a:t>Resistencia al cambio</a:t>
-            </a:r>
+              <a:t>Amoldar a las diferentes situaciones</a:t>
+            </a:r>
+          </a:p>
+          <a:p>
             <a:endParaRPr lang="es-ES" dirty="0"/>
           </a:p>
         </p:txBody>
@@ -3543,10 +3536,55 @@
           </a:prstGeom>
         </p:spPr>
       </p:pic>
+      <p:sp>
+        <p:nvSpPr>
+          <p:cNvPr id="5" name="Rectangle 4"/>
+          <p:cNvSpPr/>
+          <p:nvPr/>
+        </p:nvSpPr>
+        <p:spPr>
+          <a:xfrm>
+            <a:off x="611560" y="1497558"/>
+            <a:ext cx="7200800" cy="507831"/>
+          </a:xfrm>
+          <a:prstGeom prst="rect">
+            <a:avLst/>
+          </a:prstGeom>
+        </p:spPr>
+        <p:txBody>
+          <a:bodyPr wrap="square">
+            <a:spAutoFit/>
+          </a:bodyPr>
+          <a:lstStyle/>
+          <a:p>
+            <a:pPr algn="ctr"/>
+            <a:r>
+              <a:rPr lang="es-AR" sz="2700" u="sng" dirty="0"/>
+              <a:t>Conector RS232 (Balanza</a:t>
+            </a:r>
+            <a:r>
+              <a:rPr lang="es-AR" sz="2700" u="sng" dirty="0" smtClean="0"/>
+              <a:t>) e </a:t>
+            </a:r>
+            <a:r>
+              <a:rPr lang="es-AR" sz="2700" u="sng" dirty="0"/>
+              <a:t>i</a:t>
+            </a:r>
+            <a:r>
+              <a:rPr lang="es-AR" sz="2700" u="sng" dirty="0" smtClean="0"/>
+              <a:t>nteracción </a:t>
+            </a:r>
+            <a:r>
+              <a:rPr lang="es-AR" sz="2700" u="sng" dirty="0"/>
+              <a:t>obreros</a:t>
+            </a:r>
+          </a:p>
+        </p:txBody>
+      </p:sp>
     </p:spTree>
     <p:extLst>
       <p:ext uri="{BB962C8B-B14F-4D97-AF65-F5344CB8AC3E}">
-        <p14:creationId xmlns:p14="http://schemas.microsoft.com/office/powerpoint/2010/main" val="3612777209"/>
+        <p14:creationId xmlns:p14="http://schemas.microsoft.com/office/powerpoint/2010/main" val="4012911170"/>
       </p:ext>
     </p:extLst>
   </p:cSld>
@@ -3602,7 +3640,7 @@
           <a:p>
             <a:r>
               <a:rPr lang="es-AR" dirty="0" smtClean="0"/>
-              <a:t>Conclusiones</a:t>
+              <a:t>Experiencia</a:t>
             </a:r>
             <a:endParaRPr lang="es-ES" dirty="0"/>
           </a:p>
@@ -3620,8 +3658,8 @@
         </p:nvSpPr>
         <p:spPr>
           <a:xfrm>
-            <a:off x="-6423" y="2143397"/>
-            <a:ext cx="4146375" cy="997571"/>
+            <a:off x="35496" y="2071389"/>
+            <a:ext cx="7962799" cy="3517851"/>
           </a:xfrm>
         </p:spPr>
         <p:txBody>
@@ -3630,18 +3668,34 @@
           <a:p>
             <a:r>
               <a:rPr lang="es-AR" dirty="0" smtClean="0"/>
-              <a:t>Metodología </a:t>
-            </a:r>
-            <a:r>
-              <a:rPr lang="es-AR" dirty="0" err="1" smtClean="0"/>
-              <a:t>Scrum</a:t>
-            </a:r>
-            <a:endParaRPr lang="es-AR" dirty="0" smtClean="0"/>
-          </a:p>
-          <a:p>
-            <a:endParaRPr lang="es-AR" dirty="0" smtClean="0"/>
-          </a:p>
-          <a:p>
+              <a:t>Mejoras en la empresa</a:t>
+            </a:r>
+            <a:endParaRPr lang="es-AR" dirty="0"/>
+          </a:p>
+          <a:p>
+            <a:r>
+              <a:rPr lang="es-AR" dirty="0" smtClean="0"/>
+              <a:t>Disminución errores empleados</a:t>
+            </a:r>
+            <a:endParaRPr lang="es-AR" dirty="0"/>
+          </a:p>
+          <a:p>
+            <a:r>
+              <a:rPr lang="es-AR" dirty="0" smtClean="0"/>
+              <a:t>Trato con personal</a:t>
+            </a:r>
+          </a:p>
+          <a:p>
+            <a:r>
+              <a:rPr lang="es-AR" dirty="0" smtClean="0"/>
+              <a:t>Capacitación</a:t>
+            </a:r>
+          </a:p>
+          <a:p>
+            <a:r>
+              <a:rPr lang="es-AR" dirty="0" smtClean="0"/>
+              <a:t>Resistencia al cambio</a:t>
+            </a:r>
             <a:endParaRPr lang="es-ES" dirty="0"/>
           </a:p>
         </p:txBody>
@@ -3676,141 +3730,10 @@
           </a:prstGeom>
         </p:spPr>
       </p:pic>
-      <p:pic>
-        <p:nvPicPr>
-          <p:cNvPr id="7" name="Picture 6"/>
-          <p:cNvPicPr>
-            <a:picLocks noChangeAspect="1"/>
-          </p:cNvPicPr>
-          <p:nvPr/>
-        </p:nvPicPr>
-        <p:blipFill>
-          <a:blip r:embed="rId3">
-            <a:extLst>
-              <a:ext uri="{28A0092B-C50C-407E-A947-70E740481C1C}">
-                <a14:useLocalDpi xmlns:a14="http://schemas.microsoft.com/office/drawing/2010/main" val="0"/>
-              </a:ext>
-            </a:extLst>
-          </a:blip>
-          <a:stretch>
-            <a:fillRect/>
-          </a:stretch>
-        </p:blipFill>
-        <p:spPr>
-          <a:xfrm>
-            <a:off x="611560" y="2983979"/>
-            <a:ext cx="2952328" cy="2952328"/>
-          </a:xfrm>
-          <a:prstGeom prst="rect">
-            <a:avLst/>
-          </a:prstGeom>
-        </p:spPr>
-      </p:pic>
-      <p:sp>
-        <p:nvSpPr>
-          <p:cNvPr id="5" name="TextBox 4"/>
-          <p:cNvSpPr txBox="1"/>
-          <p:nvPr/>
-        </p:nvSpPr>
-        <p:spPr>
-          <a:xfrm>
-            <a:off x="4788024" y="3429000"/>
-            <a:ext cx="3057375" cy="2308324"/>
-          </a:xfrm>
-          <a:prstGeom prst="rect">
-            <a:avLst/>
-          </a:prstGeom>
-          <a:noFill/>
-        </p:spPr>
-        <p:txBody>
-          <a:bodyPr wrap="none" rtlCol="0">
-            <a:spAutoFit/>
-          </a:bodyPr>
-          <a:lstStyle/>
-          <a:p>
-            <a:pPr marL="285750" indent="-285750">
-              <a:buFontTx/>
-              <a:buChar char="-"/>
-            </a:pPr>
-            <a:r>
-              <a:rPr lang="es-AR" dirty="0" smtClean="0"/>
-              <a:t>Diseño incremental</a:t>
-            </a:r>
-            <a:br>
-              <a:rPr lang="es-AR" dirty="0" smtClean="0"/>
-            </a:br>
-            <a:endParaRPr lang="es-AR" dirty="0" smtClean="0"/>
-          </a:p>
-          <a:p>
-            <a:pPr marL="285750" indent="-285750">
-              <a:buFontTx/>
-              <a:buChar char="-"/>
-            </a:pPr>
-            <a:r>
-              <a:rPr lang="es-AR" dirty="0" smtClean="0"/>
-              <a:t>Único </a:t>
-            </a:r>
-            <a:r>
-              <a:rPr lang="es-AR" dirty="0" err="1"/>
-              <a:t>S</a:t>
-            </a:r>
-            <a:r>
-              <a:rPr lang="es-AR" dirty="0" err="1" smtClean="0"/>
-              <a:t>crum</a:t>
-            </a:r>
-            <a:r>
-              <a:rPr lang="es-AR" dirty="0" smtClean="0"/>
-              <a:t> </a:t>
-            </a:r>
-            <a:r>
-              <a:rPr lang="es-AR" dirty="0" smtClean="0"/>
-              <a:t>Master</a:t>
-            </a:r>
-          </a:p>
-          <a:p>
-            <a:pPr marL="285750" indent="-285750">
-              <a:buFontTx/>
-              <a:buChar char="-"/>
-            </a:pPr>
-            <a:endParaRPr lang="es-AR" dirty="0"/>
-          </a:p>
-          <a:p>
-            <a:pPr marL="285750" indent="-285750">
-              <a:buFontTx/>
-              <a:buChar char="-"/>
-            </a:pPr>
-            <a:r>
-              <a:rPr lang="es-AR" dirty="0" smtClean="0"/>
-              <a:t>Horas planeadas 400, horas</a:t>
-            </a:r>
-          </a:p>
-          <a:p>
-            <a:r>
-              <a:rPr lang="es-AR" dirty="0" smtClean="0"/>
-              <a:t>Reales 409</a:t>
-            </a:r>
-            <a:endParaRPr lang="es-AR" dirty="0" smtClean="0"/>
-          </a:p>
-          <a:p>
-            <a:pPr marL="285750" indent="-285750">
-              <a:buFontTx/>
-              <a:buChar char="-"/>
-            </a:pPr>
-            <a:endParaRPr lang="es-AR" dirty="0"/>
-          </a:p>
-          <a:p>
-            <a:pPr marL="285750" indent="-285750">
-              <a:buFontTx/>
-              <a:buChar char="-"/>
-            </a:pPr>
-            <a:endParaRPr lang="es-ES" dirty="0"/>
-          </a:p>
-        </p:txBody>
-      </p:sp>
     </p:spTree>
     <p:extLst>
       <p:ext uri="{BB962C8B-B14F-4D97-AF65-F5344CB8AC3E}">
-        <p14:creationId xmlns:p14="http://schemas.microsoft.com/office/powerpoint/2010/main" val="3720278335"/>
+        <p14:creationId xmlns:p14="http://schemas.microsoft.com/office/powerpoint/2010/main" val="3612777209"/>
       </p:ext>
     </p:extLst>
   </p:cSld>
@@ -3872,6 +3795,265 @@
           </a:p>
         </p:txBody>
       </p:sp>
+      <p:sp>
+        <p:nvSpPr>
+          <p:cNvPr id="3" name="Content Placeholder 2"/>
+          <p:cNvSpPr>
+            <a:spLocks noGrp="1"/>
+          </p:cNvSpPr>
+          <p:nvPr>
+            <p:ph idx="1"/>
+          </p:nvPr>
+        </p:nvSpPr>
+        <p:spPr>
+          <a:xfrm>
+            <a:off x="-6423" y="2143397"/>
+            <a:ext cx="4146375" cy="997571"/>
+          </a:xfrm>
+        </p:spPr>
+        <p:txBody>
+          <a:bodyPr/>
+          <a:lstStyle/>
+          <a:p>
+            <a:r>
+              <a:rPr lang="es-AR" dirty="0" smtClean="0"/>
+              <a:t>Metodología </a:t>
+            </a:r>
+            <a:r>
+              <a:rPr lang="es-AR" dirty="0" err="1" smtClean="0"/>
+              <a:t>Scrum</a:t>
+            </a:r>
+            <a:endParaRPr lang="es-AR" dirty="0" smtClean="0"/>
+          </a:p>
+          <a:p>
+            <a:endParaRPr lang="es-AR" dirty="0" smtClean="0"/>
+          </a:p>
+          <a:p>
+            <a:endParaRPr lang="es-ES" dirty="0"/>
+          </a:p>
+        </p:txBody>
+      </p:sp>
+      <p:pic>
+        <p:nvPicPr>
+          <p:cNvPr id="4" name="Picture 3"/>
+          <p:cNvPicPr>
+            <a:picLocks noChangeAspect="1"/>
+          </p:cNvPicPr>
+          <p:nvPr/>
+        </p:nvPicPr>
+        <p:blipFill>
+          <a:blip r:embed="rId2">
+            <a:extLst>
+              <a:ext uri="{28A0092B-C50C-407E-A947-70E740481C1C}">
+                <a14:useLocalDpi xmlns:a14="http://schemas.microsoft.com/office/drawing/2010/main" val="0"/>
+              </a:ext>
+            </a:extLst>
+          </a:blip>
+          <a:stretch>
+            <a:fillRect/>
+          </a:stretch>
+        </p:blipFill>
+        <p:spPr>
+          <a:xfrm>
+            <a:off x="8419999" y="0"/>
+            <a:ext cx="724001" cy="6858000"/>
+          </a:xfrm>
+          <a:prstGeom prst="rect">
+            <a:avLst/>
+          </a:prstGeom>
+        </p:spPr>
+      </p:pic>
+      <p:pic>
+        <p:nvPicPr>
+          <p:cNvPr id="7" name="Picture 6"/>
+          <p:cNvPicPr>
+            <a:picLocks noChangeAspect="1"/>
+          </p:cNvPicPr>
+          <p:nvPr/>
+        </p:nvPicPr>
+        <p:blipFill>
+          <a:blip r:embed="rId3">
+            <a:extLst>
+              <a:ext uri="{28A0092B-C50C-407E-A947-70E740481C1C}">
+                <a14:useLocalDpi xmlns:a14="http://schemas.microsoft.com/office/drawing/2010/main" val="0"/>
+              </a:ext>
+            </a:extLst>
+          </a:blip>
+          <a:stretch>
+            <a:fillRect/>
+          </a:stretch>
+        </p:blipFill>
+        <p:spPr>
+          <a:xfrm>
+            <a:off x="611560" y="2983979"/>
+            <a:ext cx="2952328" cy="2952328"/>
+          </a:xfrm>
+          <a:prstGeom prst="rect">
+            <a:avLst/>
+          </a:prstGeom>
+        </p:spPr>
+      </p:pic>
+      <p:sp>
+        <p:nvSpPr>
+          <p:cNvPr id="5" name="TextBox 4"/>
+          <p:cNvSpPr txBox="1"/>
+          <p:nvPr/>
+        </p:nvSpPr>
+        <p:spPr>
+          <a:xfrm>
+            <a:off x="4788024" y="3429000"/>
+            <a:ext cx="3057375" cy="2308324"/>
+          </a:xfrm>
+          <a:prstGeom prst="rect">
+            <a:avLst/>
+          </a:prstGeom>
+          <a:noFill/>
+        </p:spPr>
+        <p:txBody>
+          <a:bodyPr wrap="none" rtlCol="0">
+            <a:spAutoFit/>
+          </a:bodyPr>
+          <a:lstStyle/>
+          <a:p>
+            <a:pPr marL="285750" indent="-285750">
+              <a:buFontTx/>
+              <a:buChar char="-"/>
+            </a:pPr>
+            <a:r>
+              <a:rPr lang="es-AR" dirty="0" smtClean="0"/>
+              <a:t>Diseño incremental</a:t>
+            </a:r>
+            <a:br>
+              <a:rPr lang="es-AR" dirty="0" smtClean="0"/>
+            </a:br>
+            <a:endParaRPr lang="es-AR" dirty="0" smtClean="0"/>
+          </a:p>
+          <a:p>
+            <a:pPr marL="285750" indent="-285750">
+              <a:buFontTx/>
+              <a:buChar char="-"/>
+            </a:pPr>
+            <a:r>
+              <a:rPr lang="es-AR" dirty="0" smtClean="0"/>
+              <a:t>Único </a:t>
+            </a:r>
+            <a:r>
+              <a:rPr lang="es-AR" dirty="0" err="1"/>
+              <a:t>S</a:t>
+            </a:r>
+            <a:r>
+              <a:rPr lang="es-AR" dirty="0" err="1" smtClean="0"/>
+              <a:t>crum</a:t>
+            </a:r>
+            <a:r>
+              <a:rPr lang="es-AR" dirty="0" smtClean="0"/>
+              <a:t> Master</a:t>
+            </a:r>
+          </a:p>
+          <a:p>
+            <a:pPr marL="285750" indent="-285750">
+              <a:buFontTx/>
+              <a:buChar char="-"/>
+            </a:pPr>
+            <a:endParaRPr lang="es-AR" dirty="0"/>
+          </a:p>
+          <a:p>
+            <a:pPr marL="285750" indent="-285750">
+              <a:buFontTx/>
+              <a:buChar char="-"/>
+            </a:pPr>
+            <a:r>
+              <a:rPr lang="es-AR" dirty="0" smtClean="0"/>
+              <a:t>Horas planeadas 400, horas</a:t>
+            </a:r>
+          </a:p>
+          <a:p>
+            <a:r>
+              <a:rPr lang="es-AR" dirty="0" smtClean="0"/>
+              <a:t>Reales 409</a:t>
+            </a:r>
+          </a:p>
+          <a:p>
+            <a:pPr marL="285750" indent="-285750">
+              <a:buFontTx/>
+              <a:buChar char="-"/>
+            </a:pPr>
+            <a:endParaRPr lang="es-AR" dirty="0"/>
+          </a:p>
+          <a:p>
+            <a:pPr marL="285750" indent="-285750">
+              <a:buFontTx/>
+              <a:buChar char="-"/>
+            </a:pPr>
+            <a:endParaRPr lang="es-ES" dirty="0"/>
+          </a:p>
+        </p:txBody>
+      </p:sp>
+    </p:spTree>
+    <p:extLst>
+      <p:ext uri="{BB962C8B-B14F-4D97-AF65-F5344CB8AC3E}">
+        <p14:creationId xmlns:p14="http://schemas.microsoft.com/office/powerpoint/2010/main" val="3720278335"/>
+      </p:ext>
+    </p:extLst>
+  </p:cSld>
+  <p:clrMapOvr>
+    <a:masterClrMapping/>
+  </p:clrMapOvr>
+  <p:timing>
+    <p:tnLst>
+      <p:par>
+        <p:cTn id="1" dur="indefinite" restart="never" nodeType="tmRoot"/>
+      </p:par>
+    </p:tnLst>
+  </p:timing>
+</p:sld>
+</file>
+
+<file path=ppt/slides/slide14.xml><?xml version="1.0" encoding="utf-8"?>
+<p:sld xmlns:a="http://schemas.openxmlformats.org/drawingml/2006/main" xmlns:r="http://schemas.openxmlformats.org/officeDocument/2006/relationships" xmlns:p="http://schemas.openxmlformats.org/presentationml/2006/main">
+  <p:cSld>
+    <p:spTree>
+      <p:nvGrpSpPr>
+        <p:cNvPr id="1" name=""/>
+        <p:cNvGrpSpPr/>
+        <p:nvPr/>
+      </p:nvGrpSpPr>
+      <p:grpSpPr>
+        <a:xfrm>
+          <a:off x="0" y="0"/>
+          <a:ext cx="0" cy="0"/>
+          <a:chOff x="0" y="0"/>
+          <a:chExt cx="0" cy="0"/>
+        </a:xfrm>
+      </p:grpSpPr>
+      <p:sp>
+        <p:nvSpPr>
+          <p:cNvPr id="2" name="Title 1"/>
+          <p:cNvSpPr>
+            <a:spLocks noGrp="1"/>
+          </p:cNvSpPr>
+          <p:nvPr>
+            <p:ph type="title"/>
+          </p:nvPr>
+        </p:nvSpPr>
+        <p:spPr>
+          <a:xfrm>
+            <a:off x="179512" y="-27384"/>
+            <a:ext cx="8229600" cy="1143000"/>
+          </a:xfrm>
+        </p:spPr>
+        <p:txBody>
+          <a:bodyPr/>
+          <a:lstStyle/>
+          <a:p>
+            <a:r>
+              <a:rPr lang="es-AR" dirty="0" smtClean="0"/>
+              <a:t>Conclusiones</a:t>
+            </a:r>
+            <a:endParaRPr lang="es-ES" dirty="0"/>
+          </a:p>
+        </p:txBody>
+      </p:sp>
       <p:pic>
         <p:nvPicPr>
           <p:cNvPr id="4" name="Picture 3"/>
@@ -4164,7 +4346,7 @@
 </p:sld>
 </file>
 
-<file path=ppt/slides/slide14.xml><?xml version="1.0" encoding="utf-8"?>
+<file path=ppt/slides/slide15.xml><?xml version="1.0" encoding="utf-8"?>
 <p:sld xmlns:a="http://schemas.openxmlformats.org/drawingml/2006/main" xmlns:r="http://schemas.openxmlformats.org/officeDocument/2006/relationships" xmlns:p="http://schemas.openxmlformats.org/presentationml/2006/main">
   <p:cSld>
     <p:spTree>
@@ -5708,89 +5890,25 @@
         </p:nvSpPr>
         <p:spPr>
           <a:xfrm>
-            <a:off x="179512" y="44624"/>
+            <a:off x="179512" y="-27384"/>
             <a:ext cx="8229600" cy="1143000"/>
           </a:xfrm>
         </p:spPr>
         <p:txBody>
-          <a:bodyPr>
-            <a:normAutofit/>
-          </a:bodyPr>
+          <a:bodyPr/>
           <a:lstStyle/>
           <a:p>
             <a:r>
               <a:rPr lang="es-AR" dirty="0" smtClean="0"/>
-              <a:t>Dificultades</a:t>
-            </a:r>
-            <a:endParaRPr lang="es-ES" dirty="0"/>
-          </a:p>
-        </p:txBody>
-      </p:sp>
-      <p:sp>
-        <p:nvSpPr>
-          <p:cNvPr id="3" name="Content Placeholder 2"/>
-          <p:cNvSpPr>
-            <a:spLocks noGrp="1"/>
-          </p:cNvSpPr>
-          <p:nvPr>
-            <p:ph idx="1"/>
-          </p:nvPr>
-        </p:nvSpPr>
-        <p:spPr>
-          <a:xfrm>
-            <a:off x="539552" y="2276872"/>
-            <a:ext cx="7880447" cy="3384376"/>
-          </a:xfrm>
-        </p:spPr>
-        <p:txBody>
-          <a:bodyPr>
-            <a:normAutofit lnSpcReduction="10000"/>
-          </a:bodyPr>
-          <a:lstStyle/>
-          <a:p>
-            <a:r>
-              <a:rPr lang="es-AR" dirty="0" smtClean="0"/>
-              <a:t>Entender al cliente</a:t>
-            </a:r>
-          </a:p>
-          <a:p>
-            <a:r>
-              <a:rPr lang="es-AR" dirty="0" smtClean="0"/>
-              <a:t>Toma de datos</a:t>
-            </a:r>
-          </a:p>
-          <a:p>
-            <a:r>
-              <a:rPr lang="es-AR" dirty="0" smtClean="0"/>
-              <a:t>Ambientales</a:t>
-            </a:r>
-          </a:p>
-          <a:p>
-            <a:r>
-              <a:rPr lang="es-AR" dirty="0" smtClean="0"/>
-              <a:t>Tiempo limitado</a:t>
-            </a:r>
-          </a:p>
-          <a:p>
-            <a:r>
-              <a:rPr lang="es-AR" dirty="0" smtClean="0"/>
-              <a:t>Conector RS232 (Balanza)</a:t>
-            </a:r>
-          </a:p>
-          <a:p>
-            <a:r>
-              <a:rPr lang="es-AR" dirty="0" smtClean="0"/>
-              <a:t>Interacción obreros</a:t>
-            </a:r>
-          </a:p>
-          <a:p>
+              <a:t>Introducción</a:t>
+            </a:r>
             <a:endParaRPr lang="es-ES" dirty="0"/>
           </a:p>
         </p:txBody>
       </p:sp>
       <p:pic>
         <p:nvPicPr>
-          <p:cNvPr id="5" name="Picture 4"/>
+          <p:cNvPr id="4" name="Picture 3"/>
           <p:cNvPicPr>
             <a:picLocks noChangeAspect="1"/>
           </p:cNvPicPr>
@@ -5818,10 +5936,69 @@
           </a:prstGeom>
         </p:spPr>
       </p:pic>
+      <p:pic>
+        <p:nvPicPr>
+          <p:cNvPr id="12" name="Content Placeholder 11"/>
+          <p:cNvPicPr>
+            <a:picLocks noGrp="1" noChangeAspect="1"/>
+          </p:cNvPicPr>
+          <p:nvPr>
+            <p:ph idx="1"/>
+          </p:nvPr>
+        </p:nvPicPr>
+        <p:blipFill>
+          <a:blip r:embed="rId3">
+            <a:extLst>
+              <a:ext uri="{28A0092B-C50C-407E-A947-70E740481C1C}">
+                <a14:useLocalDpi xmlns:a14="http://schemas.microsoft.com/office/drawing/2010/main" val="0"/>
+              </a:ext>
+            </a:extLst>
+          </a:blip>
+          <a:stretch>
+            <a:fillRect/>
+          </a:stretch>
+        </p:blipFill>
+        <p:spPr>
+          <a:xfrm>
+            <a:off x="24417" y="1495325"/>
+            <a:ext cx="4331559" cy="4525963"/>
+          </a:xfrm>
+        </p:spPr>
+      </p:pic>
+      <p:pic>
+        <p:nvPicPr>
+          <p:cNvPr id="14" name="Picture 13"/>
+          <p:cNvPicPr>
+            <a:picLocks noChangeAspect="1"/>
+          </p:cNvPicPr>
+          <p:nvPr/>
+        </p:nvPicPr>
+        <p:blipFill>
+          <a:blip r:embed="rId4">
+            <a:extLst>
+              <a:ext uri="{28A0092B-C50C-407E-A947-70E740481C1C}">
+                <a14:useLocalDpi xmlns:a14="http://schemas.microsoft.com/office/drawing/2010/main" val="0"/>
+              </a:ext>
+            </a:extLst>
+          </a:blip>
+          <a:stretch>
+            <a:fillRect/>
+          </a:stretch>
+        </p:blipFill>
+        <p:spPr>
+          <a:xfrm>
+            <a:off x="4427984" y="1484784"/>
+            <a:ext cx="3960440" cy="4536504"/>
+          </a:xfrm>
+          <a:prstGeom prst="rect">
+            <a:avLst/>
+          </a:prstGeom>
+        </p:spPr>
+      </p:pic>
     </p:spTree>
     <p:extLst>
       <p:ext uri="{BB962C8B-B14F-4D97-AF65-F5344CB8AC3E}">
-        <p14:creationId xmlns:p14="http://schemas.microsoft.com/office/powerpoint/2010/main" val="1803874707"/>
+        <p14:creationId xmlns:p14="http://schemas.microsoft.com/office/powerpoint/2010/main" val="1345655677"/>
       </p:ext>
     </p:extLst>
   </p:cSld>
@@ -5867,17 +6044,19 @@
         </p:nvSpPr>
         <p:spPr>
           <a:xfrm>
-            <a:off x="179512" y="-27384"/>
+            <a:off x="179512" y="44624"/>
             <a:ext cx="8229600" cy="1143000"/>
           </a:xfrm>
         </p:spPr>
         <p:txBody>
-          <a:bodyPr/>
+          <a:bodyPr>
+            <a:normAutofit/>
+          </a:bodyPr>
           <a:lstStyle/>
           <a:p>
             <a:r>
               <a:rPr lang="es-AR" dirty="0" smtClean="0"/>
-              <a:t>Soluciones</a:t>
+              <a:t>Dificultades</a:t>
             </a:r>
             <a:endParaRPr lang="es-ES" dirty="0"/>
           </a:p>
@@ -5895,26 +6074,50 @@
         </p:nvSpPr>
         <p:spPr>
           <a:xfrm>
-            <a:off x="35496" y="2204864"/>
-            <a:ext cx="7962799" cy="864096"/>
+            <a:off x="539552" y="2276872"/>
+            <a:ext cx="7880447" cy="3384376"/>
           </a:xfrm>
         </p:spPr>
         <p:txBody>
           <a:bodyPr>
-            <a:normAutofit fontScale="85000" lnSpcReduction="20000"/>
+            <a:normAutofit lnSpcReduction="10000"/>
           </a:bodyPr>
           <a:lstStyle/>
           <a:p>
-            <a:endParaRPr lang="es-AR" dirty="0" smtClean="0"/>
-          </a:p>
-          <a:p>
             <a:r>
               <a:rPr lang="es-AR" dirty="0" smtClean="0"/>
-              <a:t>Hacer muchas preguntas =&gt; diagramas</a:t>
-            </a:r>
-          </a:p>
-          <a:p>
-            <a:endParaRPr lang="es-AR" dirty="0" smtClean="0"/>
+              <a:t>Entender al cliente</a:t>
+            </a:r>
+          </a:p>
+          <a:p>
+            <a:r>
+              <a:rPr lang="es-AR" dirty="0" smtClean="0"/>
+              <a:t>Toma de datos</a:t>
+            </a:r>
+          </a:p>
+          <a:p>
+            <a:r>
+              <a:rPr lang="es-AR" dirty="0" smtClean="0"/>
+              <a:t>Ambientales</a:t>
+            </a:r>
+          </a:p>
+          <a:p>
+            <a:r>
+              <a:rPr lang="es-AR" dirty="0" smtClean="0"/>
+              <a:t>Tiempo limitado</a:t>
+            </a:r>
+          </a:p>
+          <a:p>
+            <a:r>
+              <a:rPr lang="es-AR" dirty="0" smtClean="0"/>
+              <a:t>Conector RS232 (Balanza)</a:t>
+            </a:r>
+          </a:p>
+          <a:p>
+            <a:r>
+              <a:rPr lang="es-AR" dirty="0" smtClean="0"/>
+              <a:t>Interacción obreros</a:t>
+            </a:r>
           </a:p>
           <a:p>
             <a:endParaRPr lang="es-ES" dirty="0"/>
@@ -5923,7 +6126,7 @@
       </p:sp>
       <p:pic>
         <p:nvPicPr>
-          <p:cNvPr id="4" name="Picture 3"/>
+          <p:cNvPr id="5" name="Picture 4"/>
           <p:cNvPicPr>
             <a:picLocks noChangeAspect="1"/>
           </p:cNvPicPr>
@@ -5951,77 +6154,10 @@
           </a:prstGeom>
         </p:spPr>
       </p:pic>
-      <p:pic>
-        <p:nvPicPr>
-          <p:cNvPr id="6" name="Picture 5"/>
-          <p:cNvPicPr>
-            <a:picLocks noChangeAspect="1"/>
-          </p:cNvPicPr>
-          <p:nvPr/>
-        </p:nvPicPr>
-        <p:blipFill>
-          <a:blip r:embed="rId3">
-            <a:extLst>
-              <a:ext uri="{28A0092B-C50C-407E-A947-70E740481C1C}">
-                <a14:useLocalDpi xmlns:a14="http://schemas.microsoft.com/office/drawing/2010/main" val="0"/>
-              </a:ext>
-            </a:extLst>
-          </a:blip>
-          <a:stretch>
-            <a:fillRect/>
-          </a:stretch>
-        </p:blipFill>
-        <p:spPr>
-          <a:xfrm>
-            <a:off x="1779399" y="3212976"/>
-            <a:ext cx="4824536" cy="3159820"/>
-          </a:xfrm>
-          <a:prstGeom prst="rect">
-            <a:avLst/>
-          </a:prstGeom>
-        </p:spPr>
-      </p:pic>
-      <p:sp>
-        <p:nvSpPr>
-          <p:cNvPr id="7" name="TextBox 6"/>
-          <p:cNvSpPr txBox="1"/>
-          <p:nvPr/>
-        </p:nvSpPr>
-        <p:spPr>
-          <a:xfrm>
-            <a:off x="2339752" y="1556792"/>
-            <a:ext cx="3744416" cy="784830"/>
-          </a:xfrm>
-          <a:prstGeom prst="rect">
-            <a:avLst/>
-          </a:prstGeom>
-          <a:noFill/>
-        </p:spPr>
-        <p:txBody>
-          <a:bodyPr wrap="square" rtlCol="0">
-            <a:spAutoFit/>
-          </a:bodyPr>
-          <a:lstStyle/>
-          <a:p>
-            <a:pPr lvl="0" algn="ctr"/>
-            <a:r>
-              <a:rPr lang="es-AR" sz="2700" u="sng" dirty="0">
-                <a:solidFill>
-                  <a:prstClr val="black"/>
-                </a:solidFill>
-              </a:rPr>
-              <a:t>Entender al cliente</a:t>
-            </a:r>
-          </a:p>
-          <a:p>
-            <a:endParaRPr lang="es-ES" dirty="0"/>
-          </a:p>
-        </p:txBody>
-      </p:sp>
     </p:spTree>
     <p:extLst>
       <p:ext uri="{BB962C8B-B14F-4D97-AF65-F5344CB8AC3E}">
-        <p14:creationId xmlns:p14="http://schemas.microsoft.com/office/powerpoint/2010/main" val="1547018876"/>
+        <p14:creationId xmlns:p14="http://schemas.microsoft.com/office/powerpoint/2010/main" val="1803874707"/>
       </p:ext>
     </p:extLst>
   </p:cSld>
@@ -6095,29 +6231,23 @@
         </p:nvSpPr>
         <p:spPr>
           <a:xfrm>
-            <a:off x="35496" y="2924944"/>
-            <a:ext cx="7962799" cy="1008112"/>
+            <a:off x="35496" y="2204864"/>
+            <a:ext cx="7962799" cy="864096"/>
           </a:xfrm>
         </p:spPr>
         <p:txBody>
           <a:bodyPr>
-            <a:normAutofit fontScale="92500" lnSpcReduction="10000"/>
+            <a:normAutofit fontScale="85000" lnSpcReduction="20000"/>
           </a:bodyPr>
           <a:lstStyle/>
           <a:p>
+            <a:endParaRPr lang="es-AR" dirty="0" smtClean="0"/>
+          </a:p>
+          <a:p>
             <a:r>
               <a:rPr lang="es-AR" dirty="0" smtClean="0"/>
-              <a:t>Propuesta código de barra =&gt; código QR</a:t>
-            </a:r>
-          </a:p>
-          <a:p>
-            <a:r>
-              <a:rPr lang="es-AR" dirty="0"/>
-              <a:t>Analizar el contexto</a:t>
-            </a:r>
-          </a:p>
-          <a:p>
-            <a:endParaRPr lang="es-AR" dirty="0" smtClean="0"/>
+              <a:t>Hacer muchas preguntas =&gt; diagramas</a:t>
+            </a:r>
           </a:p>
           <a:p>
             <a:endParaRPr lang="es-AR" dirty="0" smtClean="0"/>
@@ -6159,7 +6289,7 @@
       </p:pic>
       <p:pic>
         <p:nvPicPr>
-          <p:cNvPr id="5" name="Content Placeholder 5"/>
+          <p:cNvPr id="6" name="Picture 5"/>
           <p:cNvPicPr>
             <a:picLocks noChangeAspect="1"/>
           </p:cNvPicPr>
@@ -6179,8 +6309,8 @@
         </p:blipFill>
         <p:spPr>
           <a:xfrm>
-            <a:off x="323528" y="4406927"/>
-            <a:ext cx="7848872" cy="1614361"/>
+            <a:off x="1779399" y="3212976"/>
+            <a:ext cx="4824536" cy="3159820"/>
           </a:xfrm>
           <a:prstGeom prst="rect">
             <a:avLst/>
@@ -6189,42 +6319,45 @@
       </p:pic>
       <p:sp>
         <p:nvSpPr>
-          <p:cNvPr id="6" name="Rectangle 5"/>
-          <p:cNvSpPr/>
+          <p:cNvPr id="7" name="TextBox 6"/>
+          <p:cNvSpPr txBox="1"/>
           <p:nvPr/>
         </p:nvSpPr>
         <p:spPr>
           <a:xfrm>
-            <a:off x="1043608" y="1497558"/>
-            <a:ext cx="6840760" cy="507831"/>
+            <a:off x="2339752" y="1556792"/>
+            <a:ext cx="3744416" cy="784830"/>
           </a:xfrm>
           <a:prstGeom prst="rect">
             <a:avLst/>
           </a:prstGeom>
-        </p:spPr>
-        <p:txBody>
-          <a:bodyPr wrap="square">
+          <a:noFill/>
+        </p:spPr>
+        <p:txBody>
+          <a:bodyPr wrap="square" rtlCol="0">
             <a:spAutoFit/>
           </a:bodyPr>
           <a:lstStyle/>
           <a:p>
-            <a:pPr algn="ctr"/>
-            <a:r>
-              <a:rPr lang="es-AR" sz="2700" u="sng" dirty="0"/>
-              <a:t>Toma de </a:t>
-            </a:r>
-            <a:r>
-              <a:rPr lang="es-AR" sz="2700" u="sng" dirty="0" smtClean="0"/>
-              <a:t>datos y Ambientales</a:t>
-            </a:r>
-            <a:endParaRPr lang="es-AR" sz="2700" u="sng" dirty="0"/>
+            <a:pPr lvl="0" algn="ctr"/>
+            <a:r>
+              <a:rPr lang="es-AR" sz="2700" u="sng" dirty="0">
+                <a:solidFill>
+                  <a:prstClr val="black"/>
+                </a:solidFill>
+              </a:rPr>
+              <a:t>Entender al cliente</a:t>
+            </a:r>
+          </a:p>
+          <a:p>
+            <a:endParaRPr lang="es-ES" dirty="0"/>
           </a:p>
         </p:txBody>
       </p:sp>
     </p:spTree>
     <p:extLst>
       <p:ext uri="{BB962C8B-B14F-4D97-AF65-F5344CB8AC3E}">
-        <p14:creationId xmlns:p14="http://schemas.microsoft.com/office/powerpoint/2010/main" val="1075864010"/>
+        <p14:creationId xmlns:p14="http://schemas.microsoft.com/office/powerpoint/2010/main" val="1547018876"/>
       </p:ext>
     </p:extLst>
   </p:cSld>
@@ -6298,18 +6431,29 @@
         </p:nvSpPr>
         <p:spPr>
           <a:xfrm>
-            <a:off x="35496" y="2564904"/>
-            <a:ext cx="7962799" cy="1440160"/>
-          </a:xfrm>
-        </p:spPr>
-        <p:txBody>
-          <a:bodyPr/>
-          <a:lstStyle/>
+            <a:off x="35496" y="2924944"/>
+            <a:ext cx="7962799" cy="1008112"/>
+          </a:xfrm>
+        </p:spPr>
+        <p:txBody>
+          <a:bodyPr>
+            <a:normAutofit fontScale="92500" lnSpcReduction="10000"/>
+          </a:bodyPr>
+          <a:lstStyle/>
+          <a:p>
+            <a:r>
+              <a:rPr lang="es-AR" dirty="0" smtClean="0"/>
+              <a:t>Propuesta código de barra =&gt; código QR</a:t>
+            </a:r>
+          </a:p>
           <a:p>
             <a:r>
               <a:rPr lang="es-AR" dirty="0"/>
-              <a:t>Ir preparado a cada reunión</a:t>
-            </a:r>
+              <a:t>Analizar el contexto</a:t>
+            </a:r>
+          </a:p>
+          <a:p>
+            <a:endParaRPr lang="es-AR" dirty="0" smtClean="0"/>
           </a:p>
           <a:p>
             <a:endParaRPr lang="es-AR" dirty="0" smtClean="0"/>
@@ -6351,7 +6495,7 @@
       </p:pic>
       <p:pic>
         <p:nvPicPr>
-          <p:cNvPr id="5" name="Picture 4"/>
+          <p:cNvPr id="5" name="Content Placeholder 5"/>
           <p:cNvPicPr>
             <a:picLocks noChangeAspect="1"/>
           </p:cNvPicPr>
@@ -6371,8 +6515,8 @@
         </p:blipFill>
         <p:spPr>
           <a:xfrm>
-            <a:off x="3081766" y="3933056"/>
-            <a:ext cx="2876952" cy="2200582"/>
+            <a:off x="323528" y="4406927"/>
+            <a:ext cx="7848872" cy="1614361"/>
           </a:xfrm>
           <a:prstGeom prst="rect">
             <a:avLst/>
@@ -6387,30 +6531,36 @@
         </p:nvSpPr>
         <p:spPr>
           <a:xfrm>
-            <a:off x="3131840" y="1628800"/>
-            <a:ext cx="2482346" cy="507831"/>
+            <a:off x="1043608" y="1497558"/>
+            <a:ext cx="6840760" cy="507831"/>
           </a:xfrm>
           <a:prstGeom prst="rect">
             <a:avLst/>
           </a:prstGeom>
         </p:spPr>
         <p:txBody>
-          <a:bodyPr wrap="none">
+          <a:bodyPr wrap="square">
             <a:spAutoFit/>
           </a:bodyPr>
           <a:lstStyle/>
           <a:p>
+            <a:pPr algn="ctr"/>
             <a:r>
               <a:rPr lang="es-AR" sz="2700" u="sng" dirty="0"/>
-              <a:t>Tiempo limitado</a:t>
-            </a:r>
+              <a:t>Toma de </a:t>
+            </a:r>
+            <a:r>
+              <a:rPr lang="es-AR" sz="2700" u="sng" dirty="0" smtClean="0"/>
+              <a:t>datos y Ambientales</a:t>
+            </a:r>
+            <a:endParaRPr lang="es-AR" sz="2700" u="sng" dirty="0"/>
           </a:p>
         </p:txBody>
       </p:sp>
     </p:spTree>
     <p:extLst>
       <p:ext uri="{BB962C8B-B14F-4D97-AF65-F5344CB8AC3E}">
-        <p14:creationId xmlns:p14="http://schemas.microsoft.com/office/powerpoint/2010/main" val="2649866490"/>
+        <p14:creationId xmlns:p14="http://schemas.microsoft.com/office/powerpoint/2010/main" val="1075864010"/>
       </p:ext>
     </p:extLst>
   </p:cSld>

</xml_diff>

<commit_message>
Cambio detalle de titulo.
</commit_message>
<xml_diff>
--- a/Presentacion/Presentacion Final.pptx
+++ b/Presentacion/Presentacion Final.pptx
@@ -302,7 +302,7 @@
           <a:p>
             <a:fld id="{D2DCFC82-683F-4A30-9D41-F91D66C01B0C}" type="datetimeFigureOut">
               <a:rPr lang="es-ES" smtClean="0"/>
-              <a:t>10/04/2016</a:t>
+              <a:t>14/04/2016</a:t>
             </a:fld>
             <a:endParaRPr lang="es-ES"/>
           </a:p>
@@ -472,7 +472,7 @@
           <a:p>
             <a:fld id="{D2DCFC82-683F-4A30-9D41-F91D66C01B0C}" type="datetimeFigureOut">
               <a:rPr lang="es-ES" smtClean="0"/>
-              <a:t>10/04/2016</a:t>
+              <a:t>14/04/2016</a:t>
             </a:fld>
             <a:endParaRPr lang="es-ES"/>
           </a:p>
@@ -652,7 +652,7 @@
           <a:p>
             <a:fld id="{D2DCFC82-683F-4A30-9D41-F91D66C01B0C}" type="datetimeFigureOut">
               <a:rPr lang="es-ES" smtClean="0"/>
-              <a:t>10/04/2016</a:t>
+              <a:t>14/04/2016</a:t>
             </a:fld>
             <a:endParaRPr lang="es-ES"/>
           </a:p>
@@ -822,7 +822,7 @@
           <a:p>
             <a:fld id="{D2DCFC82-683F-4A30-9D41-F91D66C01B0C}" type="datetimeFigureOut">
               <a:rPr lang="es-ES" smtClean="0"/>
-              <a:t>10/04/2016</a:t>
+              <a:t>14/04/2016</a:t>
             </a:fld>
             <a:endParaRPr lang="es-ES"/>
           </a:p>
@@ -1068,7 +1068,7 @@
           <a:p>
             <a:fld id="{D2DCFC82-683F-4A30-9D41-F91D66C01B0C}" type="datetimeFigureOut">
               <a:rPr lang="es-ES" smtClean="0"/>
-              <a:t>10/04/2016</a:t>
+              <a:t>14/04/2016</a:t>
             </a:fld>
             <a:endParaRPr lang="es-ES"/>
           </a:p>
@@ -1356,7 +1356,7 @@
           <a:p>
             <a:fld id="{D2DCFC82-683F-4A30-9D41-F91D66C01B0C}" type="datetimeFigureOut">
               <a:rPr lang="es-ES" smtClean="0"/>
-              <a:t>10/04/2016</a:t>
+              <a:t>14/04/2016</a:t>
             </a:fld>
             <a:endParaRPr lang="es-ES"/>
           </a:p>
@@ -1778,7 +1778,7 @@
           <a:p>
             <a:fld id="{D2DCFC82-683F-4A30-9D41-F91D66C01B0C}" type="datetimeFigureOut">
               <a:rPr lang="es-ES" smtClean="0"/>
-              <a:t>10/04/2016</a:t>
+              <a:t>14/04/2016</a:t>
             </a:fld>
             <a:endParaRPr lang="es-ES"/>
           </a:p>
@@ -1896,7 +1896,7 @@
           <a:p>
             <a:fld id="{D2DCFC82-683F-4A30-9D41-F91D66C01B0C}" type="datetimeFigureOut">
               <a:rPr lang="es-ES" smtClean="0"/>
-              <a:t>10/04/2016</a:t>
+              <a:t>14/04/2016</a:t>
             </a:fld>
             <a:endParaRPr lang="es-ES"/>
           </a:p>
@@ -1991,7 +1991,7 @@
           <a:p>
             <a:fld id="{D2DCFC82-683F-4A30-9D41-F91D66C01B0C}" type="datetimeFigureOut">
               <a:rPr lang="es-ES" smtClean="0"/>
-              <a:t>10/04/2016</a:t>
+              <a:t>14/04/2016</a:t>
             </a:fld>
             <a:endParaRPr lang="es-ES"/>
           </a:p>
@@ -2268,7 +2268,7 @@
           <a:p>
             <a:fld id="{D2DCFC82-683F-4A30-9D41-F91D66C01B0C}" type="datetimeFigureOut">
               <a:rPr lang="es-ES" smtClean="0"/>
-              <a:t>10/04/2016</a:t>
+              <a:t>14/04/2016</a:t>
             </a:fld>
             <a:endParaRPr lang="es-ES"/>
           </a:p>
@@ -2521,7 +2521,7 @@
           <a:p>
             <a:fld id="{D2DCFC82-683F-4A30-9D41-F91D66C01B0C}" type="datetimeFigureOut">
               <a:rPr lang="es-ES" smtClean="0"/>
-              <a:t>10/04/2016</a:t>
+              <a:t>14/04/2016</a:t>
             </a:fld>
             <a:endParaRPr lang="es-ES"/>
           </a:p>
@@ -2734,7 +2734,7 @@
           <a:p>
             <a:fld id="{D2DCFC82-683F-4A30-9D41-F91D66C01B0C}" type="datetimeFigureOut">
               <a:rPr lang="es-ES" smtClean="0"/>
-              <a:t>10/04/2016</a:t>
+              <a:t>14/04/2016</a:t>
             </a:fld>
             <a:endParaRPr lang="es-ES"/>
           </a:p>
@@ -5125,7 +5125,7 @@
         <p:spPr>
           <a:xfrm>
             <a:off x="107504" y="1249596"/>
-            <a:ext cx="2158668" cy="523220"/>
+            <a:ext cx="3381760" cy="523220"/>
           </a:xfrm>
           <a:prstGeom prst="rect">
             <a:avLst/>
@@ -5140,11 +5140,15 @@
           <a:p>
             <a:r>
               <a:rPr lang="es-AR" sz="2800" dirty="0" err="1" smtClean="0"/>
-              <a:t>Baradero</a:t>
+              <a:t>CelulosaBaradero</a:t>
             </a:r>
             <a:r>
               <a:rPr lang="es-AR" sz="2800" dirty="0" smtClean="0"/>
-              <a:t> S.A.</a:t>
+              <a:t> </a:t>
+            </a:r>
+            <a:r>
+              <a:rPr lang="es-AR" sz="2800" dirty="0" smtClean="0"/>
+              <a:t>S.A.</a:t>
             </a:r>
             <a:endParaRPr lang="es-ES" sz="2800" dirty="0"/>
           </a:p>

</xml_diff>